<commit_message>
feat(2_gender_analyze): add new lesson
</commit_message>
<xml_diff>
--- a/lessons/2_gender_analyze/ppt/“判断性别”Demo需求分析和初步设计（下1）.pptx
+++ b/lessons/2_gender_analyze/ppt/“判断性别”Demo需求分析和初步设计（下1）.pptx
@@ -5,10 +5,10 @@
     <p:sldMasterId id="2147483648" r:id="rId1"/>
   </p:sldMasterIdLst>
   <p:notesMasterIdLst>
-    <p:notesMasterId r:id="rId19"/>
+    <p:notesMasterId r:id="rId21"/>
   </p:notesMasterIdLst>
   <p:handoutMasterIdLst>
-    <p:handoutMasterId r:id="rId20"/>
+    <p:handoutMasterId r:id="rId22"/>
   </p:handoutMasterIdLst>
   <p:sldIdLst>
     <p:sldId id="307" r:id="rId2"/>
@@ -17,22 +17,24 @@
     <p:sldId id="1004" r:id="rId5"/>
     <p:sldId id="1000" r:id="rId6"/>
     <p:sldId id="524" r:id="rId7"/>
-    <p:sldId id="1015" r:id="rId8"/>
-    <p:sldId id="1009" r:id="rId9"/>
-    <p:sldId id="1010" r:id="rId10"/>
-    <p:sldId id="1013" r:id="rId11"/>
-    <p:sldId id="1014" r:id="rId12"/>
-    <p:sldId id="537" r:id="rId13"/>
-    <p:sldId id="536" r:id="rId14"/>
-    <p:sldId id="996" r:id="rId15"/>
-    <p:sldId id="997" r:id="rId16"/>
-    <p:sldId id="998" r:id="rId17"/>
-    <p:sldId id="653" r:id="rId18"/>
+    <p:sldId id="1018" r:id="rId8"/>
+    <p:sldId id="1015" r:id="rId9"/>
+    <p:sldId id="1019" r:id="rId10"/>
+    <p:sldId id="1016" r:id="rId11"/>
+    <p:sldId id="1009" r:id="rId12"/>
+    <p:sldId id="1013" r:id="rId13"/>
+    <p:sldId id="1014" r:id="rId14"/>
+    <p:sldId id="537" r:id="rId15"/>
+    <p:sldId id="536" r:id="rId16"/>
+    <p:sldId id="996" r:id="rId17"/>
+    <p:sldId id="997" r:id="rId18"/>
+    <p:sldId id="998" r:id="rId19"/>
+    <p:sldId id="653" r:id="rId20"/>
   </p:sldIdLst>
   <p:sldSz cx="12192000" cy="6858000"/>
   <p:notesSz cx="6858000" cy="9144000"/>
   <p:custDataLst>
-    <p:tags r:id="rId21"/>
+    <p:tags r:id="rId23"/>
   </p:custDataLst>
   <p:defaultTextStyle>
     <a:defPPr>
@@ -225,7 +227,7 @@
                 <a:latin typeface="微软雅黑" panose="020B0503020204020204" charset="-122"/>
                 <a:ea typeface="微软雅黑" panose="020B0503020204020204" charset="-122"/>
               </a:rPr>
-              <a:t>2022/8/29</a:t>
+              <a:t>2022/8/30</a:t>
             </a:fld>
             <a:endParaRPr lang="zh-CN" altLang="en-US">
               <a:latin typeface="微软雅黑" panose="020B0503020204020204" charset="-122"/>
@@ -408,7 +410,7 @@
           <a:p>
             <a:fld id="{1AC49D05-6128-4D0D-A32A-06A5E73B386C}" type="datetimeFigureOut">
               <a:rPr lang="zh-CN" altLang="en-US" smtClean="0"/>
-              <a:t>2022/8/29</a:t>
+              <a:t>2022/8/30</a:t>
             </a:fld>
             <a:endParaRPr lang="zh-CN" altLang="en-US"/>
           </a:p>
@@ -1070,7 +1072,7 @@
           <a:p>
             <a:fld id="{9EFD9D74-47D9-4702-A33C-335B63B48DBF}" type="datetimeFigureOut">
               <a:rPr lang="zh-CN" altLang="en-US" smtClean="0"/>
-              <a:t>2022/8/29</a:t>
+              <a:t>2022/8/30</a:t>
             </a:fld>
             <a:endParaRPr lang="zh-CN" altLang="en-US" dirty="0"/>
           </a:p>
@@ -1403,7 +1405,7 @@
           <a:p>
             <a:fld id="{760FBDFE-C587-4B4C-A407-44438C67B59E}" type="datetimeFigureOut">
               <a:rPr lang="zh-CN" altLang="en-US" smtClean="0"/>
-              <a:t>2022/8/29</a:t>
+              <a:t>2022/8/30</a:t>
             </a:fld>
             <a:endParaRPr lang="zh-CN" altLang="en-US"/>
           </a:p>
@@ -1576,7 +1578,7 @@
           <a:p>
             <a:fld id="{9EFD9D74-47D9-4702-A33C-335B63B48DBF}" type="datetimeFigureOut">
               <a:rPr lang="zh-CN" altLang="en-US" smtClean="0"/>
-              <a:t>2022/8/29</a:t>
+              <a:t>2022/8/30</a:t>
             </a:fld>
             <a:endParaRPr lang="zh-CN" altLang="en-US" dirty="0"/>
           </a:p>
@@ -2101,7 +2103,7 @@
           <a:p>
             <a:fld id="{760FBDFE-C587-4B4C-A407-44438C67B59E}" type="datetimeFigureOut">
               <a:rPr lang="zh-CN" altLang="en-US" smtClean="0"/>
-              <a:t>2022/8/29</a:t>
+              <a:t>2022/8/30</a:t>
             </a:fld>
             <a:endParaRPr lang="zh-CN" altLang="en-US"/>
           </a:p>
@@ -2849,7 +2851,7 @@
           <a:p>
             <a:fld id="{760FBDFE-C587-4B4C-A407-44438C67B59E}" type="datetimeFigureOut">
               <a:rPr lang="zh-CN" altLang="en-US" smtClean="0"/>
-              <a:t>2022/8/29</a:t>
+              <a:t>2022/8/30</a:t>
             </a:fld>
             <a:endParaRPr lang="zh-CN" altLang="en-US"/>
           </a:p>
@@ -3015,7 +3017,7 @@
           <a:p>
             <a:fld id="{760FBDFE-C587-4B4C-A407-44438C67B59E}" type="datetimeFigureOut">
               <a:rPr lang="zh-CN" altLang="en-US" smtClean="0"/>
-              <a:t>2022/8/29</a:t>
+              <a:t>2022/8/30</a:t>
             </a:fld>
             <a:endParaRPr lang="zh-CN" altLang="en-US"/>
           </a:p>
@@ -3129,7 +3131,7 @@
           <a:p>
             <a:fld id="{760FBDFE-C587-4B4C-A407-44438C67B59E}" type="datetimeFigureOut">
               <a:rPr lang="zh-CN" altLang="en-US" smtClean="0"/>
-              <a:t>2022/8/29</a:t>
+              <a:t>2022/8/30</a:t>
             </a:fld>
             <a:endParaRPr lang="zh-CN" altLang="en-US"/>
           </a:p>
@@ -3459,7 +3461,7 @@
           <a:p>
             <a:fld id="{9EFD9D74-47D9-4702-A33C-335B63B48DBF}" type="datetimeFigureOut">
               <a:rPr lang="zh-CN" altLang="en-US" smtClean="0"/>
-              <a:t>2022/8/29</a:t>
+              <a:t>2022/8/30</a:t>
             </a:fld>
             <a:endParaRPr lang="zh-CN" altLang="en-US" dirty="0"/>
           </a:p>
@@ -3972,7 +3974,7 @@
           <a:p>
             <a:fld id="{760FBDFE-C587-4B4C-A407-44438C67B59E}" type="datetimeFigureOut">
               <a:rPr lang="zh-CN" altLang="en-US" smtClean="0"/>
-              <a:t>2022/8/29</a:t>
+              <a:t>2022/8/30</a:t>
             </a:fld>
             <a:endParaRPr lang="zh-CN" altLang="en-US"/>
           </a:p>
@@ -4086,7 +4088,7 @@
           <a:p>
             <a:fld id="{760FBDFE-C587-4B4C-A407-44438C67B59E}" type="datetimeFigureOut">
               <a:rPr lang="zh-CN" altLang="en-US" smtClean="0"/>
-              <a:t>2022/8/29</a:t>
+              <a:t>2022/8/30</a:t>
             </a:fld>
             <a:endParaRPr lang="zh-CN" altLang="en-US"/>
           </a:p>
@@ -4374,7 +4376,7 @@
           <a:p>
             <a:fld id="{82F288E0-7875-42C4-84C8-98DBBD3BF4D2}" type="datetimeFigureOut">
               <a:rPr lang="zh-CN" altLang="en-US" smtClean="0"/>
-              <a:t>2022/8/29</a:t>
+              <a:t>2022/8/30</a:t>
             </a:fld>
             <a:endParaRPr lang="zh-CN" altLang="en-US"/>
           </a:p>
@@ -4833,7 +4835,7 @@
           <a:p>
             <a:fld id="{760FBDFE-C587-4B4C-A407-44438C67B59E}" type="datetimeFigureOut">
               <a:rPr lang="zh-CN" altLang="en-US" smtClean="0"/>
-              <a:t>2022/8/29</a:t>
+              <a:t>2022/8/30</a:t>
             </a:fld>
             <a:endParaRPr lang="zh-CN" altLang="en-US"/>
           </a:p>
@@ -5502,7 +5504,7 @@
           <a:p>
             <a:fld id="{9EFD9D74-47D9-4702-A33C-335B63B48DBF}" type="datetimeFigureOut">
               <a:rPr lang="zh-CN" altLang="en-US" smtClean="0"/>
-              <a:t>2022/8/29</a:t>
+              <a:t>2022/8/30</a:t>
             </a:fld>
             <a:endParaRPr lang="zh-CN" altLang="en-US" dirty="0"/>
           </a:p>
@@ -5650,7 +5652,7 @@
           <a:p>
             <a:fld id="{9EFD9D74-47D9-4702-A33C-335B63B48DBF}" type="datetimeFigureOut">
               <a:rPr lang="zh-CN" altLang="en-US" smtClean="0"/>
-              <a:t>2022/8/29</a:t>
+              <a:t>2022/8/30</a:t>
             </a:fld>
             <a:endParaRPr lang="zh-CN" altLang="en-US" dirty="0"/>
           </a:p>
@@ -6497,7 +6499,7 @@
             </a:pPr>
             <a:r>
               <a:rPr lang="zh-CN" altLang="en-US" dirty="0"/>
-              <a:t>如何用数值分析的方法求一个函数的最小值点？</a:t>
+              <a:t>为什么引入损失函数？</a:t>
             </a:r>
             <a:endParaRPr lang="en-US" altLang="zh-CN" dirty="0"/>
           </a:p>
@@ -6506,6 +6508,13 @@
               <a:buFont typeface="Arial" panose="020B0604020202020204" pitchFamily="34" charset="0"/>
               <a:buChar char="•"/>
             </a:pPr>
+            <a:r>
+              <a:rPr lang="zh-CN" altLang="en-US" dirty="0"/>
+              <a:t>有了损失函数，如何具体判断得到一组权重、偏移是合适的呢？</a:t>
+            </a:r>
+            <a:endParaRPr lang="en-US" altLang="zh-CN" dirty="0"/>
+          </a:p>
+          <a:p>
             <a:endParaRPr lang="en-US" altLang="zh-CN" dirty="0"/>
           </a:p>
           <a:p>
@@ -6515,7 +6524,7 @@
             </a:pPr>
             <a:r>
               <a:rPr lang="zh-CN" altLang="en-US" dirty="0"/>
-              <a:t>自学、互学、展学</a:t>
+              <a:t>自学、展学</a:t>
             </a:r>
           </a:p>
           <a:p>
@@ -6553,208 +6562,20 @@
           <a:p>
             <a:r>
               <a:rPr lang="zh-CN" altLang="en-US" dirty="0"/>
-              <a:t>主问题：什么是随机梯度下降</a:t>
+              <a:t>结学</a:t>
             </a:r>
           </a:p>
         </p:txBody>
       </p:sp>
-      <p:sp>
-        <p:nvSpPr>
-          <p:cNvPr id="6" name="文本框 5">
-            <a:extLst>
-              <a:ext uri="{FF2B5EF4-FFF2-40B4-BE49-F238E27FC236}">
-                <a16:creationId xmlns:a16="http://schemas.microsoft.com/office/drawing/2014/main" id="{E503E376-C64A-65D3-63D8-37F7FB333BC9}"/>
-              </a:ext>
-            </a:extLst>
-          </p:cNvPr>
-          <p:cNvSpPr txBox="1"/>
-          <p:nvPr/>
-        </p:nvSpPr>
-        <p:spPr>
-          <a:xfrm>
-            <a:off x="669882" y="3985765"/>
-            <a:ext cx="10668379" cy="2308324"/>
-          </a:xfrm>
-          <a:prstGeom prst="rect">
-            <a:avLst/>
-          </a:prstGeom>
-          <a:noFill/>
-        </p:spPr>
-        <p:txBody>
-          <a:bodyPr wrap="square" rtlCol="0">
-            <a:spAutoFit/>
-          </a:bodyPr>
-          <a:lstStyle/>
-          <a:p>
-            <a:r>
-              <a:rPr lang="zh-CN" altLang="en-US" dirty="0"/>
-              <a:t>首先，我们随便选择一个点开始，比如上图的𝑥</a:t>
-            </a:r>
-            <a:r>
-              <a:rPr lang="en-US" altLang="zh-CN" dirty="0"/>
-              <a:t>0</a:t>
-            </a:r>
-            <a:r>
-              <a:rPr lang="zh-CN" altLang="en" dirty="0"/>
-              <a:t>。</a:t>
-            </a:r>
-            <a:r>
-              <a:rPr lang="zh-CN" altLang="en-US" dirty="0"/>
-              <a:t>接下来，每次迭代修改𝑋为𝑥</a:t>
-            </a:r>
-            <a:r>
-              <a:rPr lang="en-US" altLang="zh-CN" dirty="0"/>
-              <a:t>1,</a:t>
-            </a:r>
-            <a:r>
-              <a:rPr lang="zh-CN" altLang="en-US" dirty="0"/>
-              <a:t>𝑥</a:t>
-            </a:r>
-            <a:r>
-              <a:rPr lang="en-US" altLang="zh-CN" dirty="0"/>
-              <a:t>2,</a:t>
-            </a:r>
-            <a:r>
-              <a:rPr lang="zh-CN" altLang="en-US" dirty="0"/>
-              <a:t>𝑥</a:t>
-            </a:r>
-            <a:r>
-              <a:rPr lang="en-US" altLang="zh-CN" dirty="0"/>
-              <a:t>3</a:t>
-            </a:r>
-            <a:r>
-              <a:rPr lang="en" altLang="zh-CN" dirty="0"/>
-              <a:t>......</a:t>
-            </a:r>
-            <a:r>
-              <a:rPr lang="zh-CN" altLang="en-US" dirty="0"/>
-              <a:t>经过数次迭代后最终达到函数最小值点。</a:t>
-            </a:r>
-          </a:p>
-          <a:p>
-            <a:r>
-              <a:rPr lang="zh-CN" altLang="en-US" dirty="0"/>
-              <a:t>你可能要问了，为啥每次修改𝑋</a:t>
-            </a:r>
-            <a:r>
-              <a:rPr lang="zh-CN" altLang="en" dirty="0"/>
-              <a:t>，</a:t>
-            </a:r>
-            <a:r>
-              <a:rPr lang="zh-CN" altLang="en-US" dirty="0"/>
-              <a:t>都能往函数最小值那个方向前进呢？这里的奥秘在于，我们每次都是向函数𝑦</a:t>
-            </a:r>
-            <a:r>
-              <a:rPr lang="en-US" altLang="zh-CN" dirty="0"/>
-              <a:t>=</a:t>
-            </a:r>
-            <a:r>
-              <a:rPr lang="zh-CN" altLang="en-US" dirty="0"/>
-              <a:t>𝑓</a:t>
-            </a:r>
-            <a:r>
-              <a:rPr lang="en-US" altLang="zh-CN" dirty="0"/>
-              <a:t>(</a:t>
-            </a:r>
-            <a:r>
-              <a:rPr lang="zh-CN" altLang="en-US" dirty="0"/>
-              <a:t>𝑥</a:t>
-            </a:r>
-            <a:r>
-              <a:rPr lang="en-US" altLang="zh-CN" dirty="0"/>
-              <a:t>)</a:t>
-            </a:r>
-            <a:r>
-              <a:rPr lang="en" altLang="zh-CN" dirty="0"/>
-              <a:t> </a:t>
-            </a:r>
-            <a:r>
-              <a:rPr lang="zh-CN" altLang="en-US" dirty="0"/>
-              <a:t>的梯度的相反方向来修改𝑋</a:t>
-            </a:r>
-            <a:r>
-              <a:rPr lang="zh-CN" altLang="en" dirty="0"/>
-              <a:t>。</a:t>
-            </a:r>
-            <a:endParaRPr lang="en-US" altLang="zh-CN" dirty="0"/>
-          </a:p>
-          <a:p>
-            <a:br>
-              <a:rPr lang="zh-CN" altLang="en" dirty="0"/>
-            </a:br>
-            <a:r>
-              <a:rPr lang="zh-CN" altLang="en-US" dirty="0"/>
-              <a:t>什么是梯度呢？梯度是一个向量，它指向函数值上升最快的方向。显然，梯度的反方向当然就是函数值下降最快的方向了。</a:t>
-            </a:r>
-            <a:br>
-              <a:rPr lang="zh-CN" altLang="en-US" dirty="0"/>
-            </a:br>
-            <a:r>
-              <a:rPr lang="zh-CN" altLang="en-US" dirty="0"/>
-              <a:t>我们每次沿着梯度相反方向去修改𝑋</a:t>
-            </a:r>
-            <a:r>
-              <a:rPr lang="zh-CN" altLang="en" dirty="0"/>
-              <a:t>，</a:t>
-            </a:r>
-            <a:r>
-              <a:rPr lang="zh-CN" altLang="en-US" dirty="0"/>
-              <a:t>当然就能走到函数的最小值附近。</a:t>
-            </a:r>
-          </a:p>
-        </p:txBody>
-      </p:sp>
-      <p:pic>
-        <p:nvPicPr>
-          <p:cNvPr id="1026" name="Picture 2" descr="image">
-            <a:extLst>
-              <a:ext uri="{FF2B5EF4-FFF2-40B4-BE49-F238E27FC236}">
-                <a16:creationId xmlns:a16="http://schemas.microsoft.com/office/drawing/2014/main" id="{BAA015EA-9252-0E83-3389-90E8F9BC1E02}"/>
-              </a:ext>
-            </a:extLst>
-          </p:cNvPr>
-          <p:cNvPicPr>
-            <a:picLocks noChangeAspect="1" noChangeArrowheads="1"/>
-          </p:cNvPicPr>
-          <p:nvPr/>
-        </p:nvPicPr>
-        <p:blipFill>
-          <a:blip r:embed="rId3">
-            <a:extLst>
-              <a:ext uri="{28A0092B-C50C-407E-A947-70E740481C1C}">
-                <a14:useLocalDpi xmlns:a14="http://schemas.microsoft.com/office/drawing/2010/main" val="0"/>
-              </a:ext>
-            </a:extLst>
-          </a:blip>
-          <a:srcRect/>
-          <a:stretch>
-            <a:fillRect/>
-          </a:stretch>
-        </p:blipFill>
-        <p:spPr bwMode="auto">
-          <a:xfrm>
-            <a:off x="8752560" y="1001233"/>
-            <a:ext cx="2869418" cy="2905285"/>
-          </a:xfrm>
-          <a:prstGeom prst="rect">
-            <a:avLst/>
-          </a:prstGeom>
-          <a:noFill/>
-          <a:extLst>
-            <a:ext uri="{909E8E84-426E-40DD-AFC4-6F175D3DCCD1}">
-              <a14:hiddenFill xmlns:a14="http://schemas.microsoft.com/office/drawing/2010/main">
-                <a:solidFill>
-                  <a:srgbClr val="FFFFFF"/>
-                </a:solidFill>
-              </a14:hiddenFill>
-            </a:ext>
-          </a:extLst>
-        </p:spPr>
-      </p:pic>
     </p:spTree>
     <p:custDataLst>
       <p:tags r:id="rId1"/>
     </p:custDataLst>
+    <p:extLst>
+      <p:ext uri="{BB962C8B-B14F-4D97-AF65-F5344CB8AC3E}">
+        <p14:creationId xmlns:p14="http://schemas.microsoft.com/office/powerpoint/2010/main" val="2441991200"/>
+      </p:ext>
+    </p:extLst>
   </p:cSld>
   <p:clrMapOvr>
     <a:masterClrMapping/>
@@ -6842,7 +6663,589 @@
                                           </p:stCondLst>
                                         </p:cTn>
                                         <p:tgtEl>
+                                          <p:spTgt spid="2">
+                                            <p:txEl>
+                                              <p:pRg st="1" end="1"/>
+                                            </p:txEl>
+                                          </p:spTgt>
+                                        </p:tgtEl>
+                                        <p:attrNameLst>
+                                          <p:attrName>style.visibility</p:attrName>
+                                        </p:attrNameLst>
+                                      </p:cBhvr>
+                                      <p:to>
+                                        <p:strVal val="visible"/>
+                                      </p:to>
+                                    </p:set>
+                                  </p:childTnLst>
+                                </p:cTn>
+                              </p:par>
+                            </p:childTnLst>
+                          </p:cTn>
+                        </p:par>
+                      </p:childTnLst>
+                    </p:cTn>
+                  </p:par>
+                </p:childTnLst>
+              </p:cTn>
+              <p:prevCondLst>
+                <p:cond evt="onPrev" delay="0">
+                  <p:tgtEl>
+                    <p:sldTgt/>
+                  </p:tgtEl>
+                </p:cond>
+              </p:prevCondLst>
+              <p:nextCondLst>
+                <p:cond evt="onNext" delay="0">
+                  <p:tgtEl>
+                    <p:sldTgt/>
+                  </p:tgtEl>
+                </p:cond>
+              </p:nextCondLst>
+            </p:seq>
+          </p:childTnLst>
+        </p:cTn>
+      </p:par>
+    </p:tnLst>
+  </p:timing>
+</p:sld>
+</file>
+
+<file path=ppt/slides/slide11.xml><?xml version="1.0" encoding="utf-8"?>
+<p:sld xmlns:a="http://schemas.openxmlformats.org/drawingml/2006/main" xmlns:r="http://schemas.openxmlformats.org/officeDocument/2006/relationships" xmlns:p="http://schemas.openxmlformats.org/presentationml/2006/main">
+  <p:cSld>
+    <p:spTree>
+      <p:nvGrpSpPr>
+        <p:cNvPr id="1" name=""/>
+        <p:cNvGrpSpPr/>
+        <p:nvPr/>
+      </p:nvGrpSpPr>
+      <p:grpSpPr>
+        <a:xfrm>
+          <a:off x="0" y="0"/>
+          <a:ext cx="0" cy="0"/>
+          <a:chOff x="0" y="0"/>
+          <a:chExt cx="0" cy="0"/>
+        </a:xfrm>
+      </p:grpSpPr>
+      <p:sp>
+        <p:nvSpPr>
+          <p:cNvPr id="2" name="标题 1"/>
+          <p:cNvSpPr>
+            <a:spLocks noGrp="1"/>
+          </p:cNvSpPr>
+          <p:nvPr>
+            <p:ph type="title"/>
+          </p:nvPr>
+        </p:nvSpPr>
+        <p:spPr/>
+        <p:txBody>
+          <a:bodyPr/>
+          <a:lstStyle/>
+          <a:p>
+            <a:r>
+              <a:rPr dirty="0">
+                <a:sym typeface="+mn-ea"/>
+              </a:rPr>
+              <a:t>主问题：</a:t>
+            </a:r>
+            <a:r>
+              <a:rPr lang="en-US" dirty="0" err="1">
+                <a:sym typeface="+mn-ea"/>
+              </a:rPr>
+              <a:t>什么是随机梯度下降</a:t>
+            </a:r>
+            <a:endParaRPr lang="zh-CN" altLang="en-US" dirty="0"/>
+          </a:p>
+        </p:txBody>
+      </p:sp>
+    </p:spTree>
+    <p:custDataLst>
+      <p:tags r:id="rId1"/>
+    </p:custDataLst>
+    <p:extLst>
+      <p:ext uri="{BB962C8B-B14F-4D97-AF65-F5344CB8AC3E}">
+        <p14:creationId xmlns:p14="http://schemas.microsoft.com/office/powerpoint/2010/main" val="2111602534"/>
+      </p:ext>
+    </p:extLst>
+  </p:cSld>
+  <p:clrMapOvr>
+    <a:masterClrMapping/>
+  </p:clrMapOvr>
+</p:sld>
+</file>
+
+<file path=ppt/slides/slide12.xml><?xml version="1.0" encoding="utf-8"?>
+<p:sld xmlns:a="http://schemas.openxmlformats.org/drawingml/2006/main" xmlns:r="http://schemas.openxmlformats.org/officeDocument/2006/relationships" xmlns:p="http://schemas.openxmlformats.org/presentationml/2006/main">
+  <p:cSld>
+    <p:spTree>
+      <p:nvGrpSpPr>
+        <p:cNvPr id="1" name=""/>
+        <p:cNvGrpSpPr/>
+        <p:nvPr/>
+      </p:nvGrpSpPr>
+      <p:grpSpPr>
+        <a:xfrm>
+          <a:off x="0" y="0"/>
+          <a:ext cx="0" cy="0"/>
+          <a:chOff x="0" y="0"/>
+          <a:chExt cx="0" cy="0"/>
+        </a:xfrm>
+      </p:grpSpPr>
+      <p:sp>
+        <p:nvSpPr>
+          <p:cNvPr id="2" name="文本占位符 1"/>
+          <p:cNvSpPr>
+            <a:spLocks noGrp="1"/>
+          </p:cNvSpPr>
+          <p:nvPr>
+            <p:ph type="body" idx="1"/>
+          </p:nvPr>
+        </p:nvSpPr>
+        <p:spPr/>
+        <p:txBody>
+          <a:bodyPr/>
+          <a:lstStyle/>
+          <a:p>
+            <a:pPr marL="285750" indent="-285750">
+              <a:buFont typeface="Arial" panose="020B0604020202020204" pitchFamily="34" charset="0"/>
+              <a:buChar char="•"/>
+            </a:pPr>
+            <a:r>
+              <a:rPr lang="zh-CN" altLang="en-US" dirty="0"/>
+              <a:t>如何用数值分析的方法求一个函数的最小值点？</a:t>
+            </a:r>
+            <a:endParaRPr lang="en-US" altLang="zh-CN" dirty="0"/>
+          </a:p>
+          <a:p>
+            <a:pPr marL="285750" indent="-285750">
+              <a:buFont typeface="Arial" panose="020B0604020202020204" pitchFamily="34" charset="0"/>
+              <a:buChar char="•"/>
+            </a:pPr>
+            <a:endParaRPr lang="en-US" altLang="zh-CN" dirty="0"/>
+          </a:p>
+          <a:p>
+            <a:pPr marL="285750" indent="-285750">
+              <a:buFont typeface="Arial" panose="020B0604020202020204" pitchFamily="34" charset="0"/>
+              <a:buChar char="•"/>
+            </a:pPr>
+            <a:r>
+              <a:rPr lang="zh-CN" altLang="en-US" dirty="0"/>
+              <a:t>自学、互学、展学</a:t>
+            </a:r>
+          </a:p>
+          <a:p>
+            <a:pPr marL="285750" indent="-285750">
+              <a:buFont typeface="Arial" panose="020B0604020202020204" pitchFamily="34" charset="0"/>
+              <a:buChar char="•"/>
+            </a:pPr>
+            <a:endParaRPr lang="en-US" altLang="zh-CN" dirty="0"/>
+          </a:p>
+          <a:p>
+            <a:pPr marL="285750" indent="-285750">
+              <a:buFont typeface="Arial" panose="020B0604020202020204" pitchFamily="34" charset="0"/>
+              <a:buChar char="•"/>
+            </a:pPr>
+            <a:endParaRPr dirty="0">
+              <a:sym typeface="+mn-ea"/>
+            </a:endParaRPr>
+          </a:p>
+        </p:txBody>
+      </p:sp>
+      <p:sp>
+        <p:nvSpPr>
+          <p:cNvPr id="3" name="标题 2"/>
+          <p:cNvSpPr>
+            <a:spLocks noGrp="1"/>
+          </p:cNvSpPr>
+          <p:nvPr>
+            <p:ph type="title"/>
+          </p:nvPr>
+        </p:nvSpPr>
+        <p:spPr/>
+        <p:txBody>
+          <a:bodyPr/>
+          <a:lstStyle/>
+          <a:p>
+            <a:r>
+              <a:rPr lang="zh-CN" altLang="en-US" dirty="0"/>
+              <a:t>主问题：什么是随机梯度下降</a:t>
+            </a:r>
+          </a:p>
+        </p:txBody>
+      </p:sp>
+      <p:sp>
+        <p:nvSpPr>
+          <p:cNvPr id="6" name="文本框 5">
+            <a:extLst>
+              <a:ext uri="{FF2B5EF4-FFF2-40B4-BE49-F238E27FC236}">
+                <a16:creationId xmlns:a16="http://schemas.microsoft.com/office/drawing/2014/main" id="{E503E376-C64A-65D3-63D8-37F7FB333BC9}"/>
+              </a:ext>
+            </a:extLst>
+          </p:cNvPr>
+          <p:cNvSpPr txBox="1"/>
+          <p:nvPr/>
+        </p:nvSpPr>
+        <p:spPr>
+          <a:xfrm>
+            <a:off x="669882" y="4027506"/>
+            <a:ext cx="10668379" cy="2031325"/>
+          </a:xfrm>
+          <a:prstGeom prst="rect">
+            <a:avLst/>
+          </a:prstGeom>
+          <a:noFill/>
+        </p:spPr>
+        <p:txBody>
+          <a:bodyPr wrap="square" rtlCol="0">
+            <a:spAutoFit/>
+          </a:bodyPr>
+          <a:lstStyle/>
+          <a:p>
+            <a:r>
+              <a:rPr lang="zh-CN" altLang="en-US" dirty="0"/>
+              <a:t>首先，我们随便选择一个点开始，比如上图的𝑥</a:t>
+            </a:r>
+            <a:r>
+              <a:rPr lang="en-US" altLang="zh-CN" dirty="0"/>
+              <a:t>0</a:t>
+            </a:r>
+            <a:r>
+              <a:rPr lang="zh-CN" altLang="en" dirty="0"/>
+              <a:t>。</a:t>
+            </a:r>
+            <a:r>
+              <a:rPr lang="zh-CN" altLang="en-US" dirty="0"/>
+              <a:t>接下来，每次迭代修改𝑋为𝑥</a:t>
+            </a:r>
+            <a:r>
+              <a:rPr lang="en-US" altLang="zh-CN" dirty="0"/>
+              <a:t>1,</a:t>
+            </a:r>
+            <a:r>
+              <a:rPr lang="zh-CN" altLang="en-US" dirty="0"/>
+              <a:t>𝑥</a:t>
+            </a:r>
+            <a:r>
+              <a:rPr lang="en-US" altLang="zh-CN" dirty="0"/>
+              <a:t>2,</a:t>
+            </a:r>
+            <a:r>
+              <a:rPr lang="zh-CN" altLang="en-US" dirty="0"/>
+              <a:t>𝑥</a:t>
+            </a:r>
+            <a:r>
+              <a:rPr lang="en-US" altLang="zh-CN" dirty="0"/>
+              <a:t>3</a:t>
+            </a:r>
+            <a:r>
+              <a:rPr lang="en" altLang="zh-CN" dirty="0"/>
+              <a:t>......</a:t>
+            </a:r>
+            <a:r>
+              <a:rPr lang="zh-CN" altLang="en-US" dirty="0"/>
+              <a:t>经过数次迭代后最终达到函数最小值点。</a:t>
+            </a:r>
+          </a:p>
+          <a:p>
+            <a:r>
+              <a:rPr lang="zh-CN" altLang="en-US" dirty="0"/>
+              <a:t>你可能要问了，为啥每次修改𝑋</a:t>
+            </a:r>
+            <a:r>
+              <a:rPr lang="zh-CN" altLang="en" dirty="0"/>
+              <a:t>，</a:t>
+            </a:r>
+            <a:r>
+              <a:rPr lang="zh-CN" altLang="en-US" dirty="0"/>
+              <a:t>都能往函数最小值那个方向前进呢？这里的奥秘在于，我们每次都是向函数𝑦</a:t>
+            </a:r>
+            <a:r>
+              <a:rPr lang="en-US" altLang="zh-CN" dirty="0"/>
+              <a:t>=</a:t>
+            </a:r>
+            <a:r>
+              <a:rPr lang="zh-CN" altLang="en-US" dirty="0"/>
+              <a:t>𝑓</a:t>
+            </a:r>
+            <a:r>
+              <a:rPr lang="en-US" altLang="zh-CN" dirty="0"/>
+              <a:t>(</a:t>
+            </a:r>
+            <a:r>
+              <a:rPr lang="zh-CN" altLang="en-US" dirty="0"/>
+              <a:t>𝑥</a:t>
+            </a:r>
+            <a:r>
+              <a:rPr lang="en-US" altLang="zh-CN" dirty="0"/>
+              <a:t>)</a:t>
+            </a:r>
+            <a:r>
+              <a:rPr lang="en" altLang="zh-CN" dirty="0"/>
+              <a:t> </a:t>
+            </a:r>
+            <a:r>
+              <a:rPr lang="zh-CN" altLang="en-US" dirty="0"/>
+              <a:t>的梯度的相反方向来修改𝑋</a:t>
+            </a:r>
+            <a:r>
+              <a:rPr lang="zh-CN" altLang="en" dirty="0"/>
+              <a:t>。</a:t>
+            </a:r>
+            <a:endParaRPr lang="en-US" altLang="zh-CN" dirty="0"/>
+          </a:p>
+          <a:p>
+            <a:br>
+              <a:rPr lang="zh-CN" altLang="en" dirty="0"/>
+            </a:br>
+            <a:r>
+              <a:rPr lang="zh-CN" altLang="en-US" dirty="0"/>
+              <a:t>什么是梯度呢？梯度是一个向量，它指向函数值上升最快的方向。显然，梯度的反方向当然就是函数值下降最快的方向了。</a:t>
+            </a:r>
+          </a:p>
+        </p:txBody>
+      </p:sp>
+      <p:pic>
+        <p:nvPicPr>
+          <p:cNvPr id="1026" name="Picture 2" descr="image">
+            <a:extLst>
+              <a:ext uri="{FF2B5EF4-FFF2-40B4-BE49-F238E27FC236}">
+                <a16:creationId xmlns:a16="http://schemas.microsoft.com/office/drawing/2014/main" id="{BAA015EA-9252-0E83-3389-90E8F9BC1E02}"/>
+              </a:ext>
+            </a:extLst>
+          </p:cNvPr>
+          <p:cNvPicPr>
+            <a:picLocks noChangeAspect="1" noChangeArrowheads="1"/>
+          </p:cNvPicPr>
+          <p:nvPr/>
+        </p:nvPicPr>
+        <p:blipFill>
+          <a:blip r:embed="rId3">
+            <a:extLst>
+              <a:ext uri="{28A0092B-C50C-407E-A947-70E740481C1C}">
+                <a14:useLocalDpi xmlns:a14="http://schemas.microsoft.com/office/drawing/2010/main" val="0"/>
+              </a:ext>
+            </a:extLst>
+          </a:blip>
+          <a:srcRect/>
+          <a:stretch>
+            <a:fillRect/>
+          </a:stretch>
+        </p:blipFill>
+        <p:spPr bwMode="auto">
+          <a:xfrm>
+            <a:off x="8752560" y="1001233"/>
+            <a:ext cx="2869418" cy="2905285"/>
+          </a:xfrm>
+          <a:prstGeom prst="rect">
+            <a:avLst/>
+          </a:prstGeom>
+          <a:noFill/>
+          <a:extLst>
+            <a:ext uri="{909E8E84-426E-40DD-AFC4-6F175D3DCCD1}">
+              <a14:hiddenFill xmlns:a14="http://schemas.microsoft.com/office/drawing/2010/main">
+                <a:solidFill>
+                  <a:srgbClr val="FFFFFF"/>
+                </a:solidFill>
+              </a14:hiddenFill>
+            </a:ext>
+          </a:extLst>
+        </p:spPr>
+      </p:pic>
+      <p:sp>
+        <p:nvSpPr>
+          <p:cNvPr id="4" name="文本框 3">
+            <a:extLst>
+              <a:ext uri="{FF2B5EF4-FFF2-40B4-BE49-F238E27FC236}">
+                <a16:creationId xmlns:a16="http://schemas.microsoft.com/office/drawing/2014/main" id="{7EA206F3-E6C9-8B07-7E3B-DA8656C21F4E}"/>
+              </a:ext>
+            </a:extLst>
+          </p:cNvPr>
+          <p:cNvSpPr txBox="1"/>
+          <p:nvPr/>
+        </p:nvSpPr>
+        <p:spPr>
+          <a:xfrm>
+            <a:off x="3439441" y="2228702"/>
+            <a:ext cx="3877985" cy="369332"/>
+          </a:xfrm>
+          <a:prstGeom prst="rect">
+            <a:avLst/>
+          </a:prstGeom>
+          <a:noFill/>
+        </p:spPr>
+        <p:txBody>
+          <a:bodyPr wrap="none" rtlCol="0">
+            <a:spAutoFit/>
+          </a:bodyPr>
+          <a:lstStyle/>
+          <a:p>
+            <a:r>
+              <a:rPr kumimoji="1" lang="zh-CN" altLang="en-US" dirty="0"/>
+              <a:t>求出来的是极小值点还是最小值点？</a:t>
+            </a:r>
+          </a:p>
+        </p:txBody>
+      </p:sp>
+      <p:sp>
+        <p:nvSpPr>
+          <p:cNvPr id="5" name="文本框 4">
+            <a:extLst>
+              <a:ext uri="{FF2B5EF4-FFF2-40B4-BE49-F238E27FC236}">
+                <a16:creationId xmlns:a16="http://schemas.microsoft.com/office/drawing/2014/main" id="{43ED3169-22B7-E688-4D5F-F885D3E05C40}"/>
+              </a:ext>
+            </a:extLst>
+          </p:cNvPr>
+          <p:cNvSpPr txBox="1"/>
+          <p:nvPr/>
+        </p:nvSpPr>
+        <p:spPr>
+          <a:xfrm>
+            <a:off x="3439441" y="2719022"/>
+            <a:ext cx="2108269" cy="369332"/>
+          </a:xfrm>
+          <a:prstGeom prst="rect">
+            <a:avLst/>
+          </a:prstGeom>
+          <a:noFill/>
+        </p:spPr>
+        <p:txBody>
+          <a:bodyPr wrap="none" rtlCol="0">
+            <a:spAutoFit/>
+          </a:bodyPr>
+          <a:lstStyle/>
+          <a:p>
+            <a:r>
+              <a:rPr kumimoji="1" lang="zh-CN" altLang="en-US" dirty="0"/>
+              <a:t>如何求最小值点？</a:t>
+            </a:r>
+          </a:p>
+        </p:txBody>
+      </p:sp>
+      <p:sp>
+        <p:nvSpPr>
+          <p:cNvPr id="7" name="文本框 6">
+            <a:extLst>
+              <a:ext uri="{FF2B5EF4-FFF2-40B4-BE49-F238E27FC236}">
+                <a16:creationId xmlns:a16="http://schemas.microsoft.com/office/drawing/2014/main" id="{F9590B67-64EE-C831-0B55-2E9B3481799D}"/>
+              </a:ext>
+            </a:extLst>
+          </p:cNvPr>
+          <p:cNvSpPr txBox="1"/>
+          <p:nvPr/>
+        </p:nvSpPr>
+        <p:spPr>
+          <a:xfrm>
+            <a:off x="3080518" y="3213716"/>
+            <a:ext cx="5313119" cy="369332"/>
+          </a:xfrm>
+          <a:prstGeom prst="rect">
+            <a:avLst/>
+          </a:prstGeom>
+          <a:noFill/>
+        </p:spPr>
+        <p:txBody>
+          <a:bodyPr wrap="square" rtlCol="0">
+            <a:spAutoFit/>
+          </a:bodyPr>
+          <a:lstStyle/>
+          <a:p>
+            <a:r>
+              <a:rPr lang="zh-CN" altLang="en-US" dirty="0"/>
+              <a:t>再取多组值来判断（可升级为小批量随机梯度下降）</a:t>
+            </a:r>
+            <a:endParaRPr kumimoji="1" lang="zh-CN" altLang="en-US" dirty="0"/>
+          </a:p>
+        </p:txBody>
+      </p:sp>
+    </p:spTree>
+    <p:custDataLst>
+      <p:tags r:id="rId1"/>
+    </p:custDataLst>
+  </p:cSld>
+  <p:clrMapOvr>
+    <a:masterClrMapping/>
+  </p:clrMapOvr>
+  <p:timing>
+    <p:tnLst>
+      <p:par>
+        <p:cTn id="1" dur="indefinite" restart="never" nodeType="tmRoot">
+          <p:childTnLst>
+            <p:seq concurrent="1" nextAc="seek">
+              <p:cTn id="2" dur="indefinite" nodeType="mainSeq">
+                <p:childTnLst>
+                  <p:par>
+                    <p:cTn id="3" fill="hold">
+                      <p:stCondLst>
+                        <p:cond delay="indefinite"/>
+                      </p:stCondLst>
+                      <p:childTnLst>
+                        <p:par>
+                          <p:cTn id="4" fill="hold">
+                            <p:stCondLst>
+                              <p:cond delay="0"/>
+                            </p:stCondLst>
+                            <p:childTnLst>
+                              <p:par>
+                                <p:cTn id="5" presetID="1" presetClass="entr" presetSubtype="0" fill="hold" nodeType="clickEffect">
+                                  <p:stCondLst>
+                                    <p:cond delay="0"/>
+                                  </p:stCondLst>
+                                  <p:childTnLst>
+                                    <p:set>
+                                      <p:cBhvr>
+                                        <p:cTn id="6" dur="1" fill="hold">
+                                          <p:stCondLst>
+                                            <p:cond delay="0"/>
+                                          </p:stCondLst>
+                                        </p:cTn>
+                                        <p:tgtEl>
                                           <p:spTgt spid="1026"/>
+                                        </p:tgtEl>
+                                        <p:attrNameLst>
+                                          <p:attrName>style.visibility</p:attrName>
+                                        </p:attrNameLst>
+                                      </p:cBhvr>
+                                      <p:to>
+                                        <p:strVal val="visible"/>
+                                      </p:to>
+                                    </p:set>
+                                  </p:childTnLst>
+                                </p:cTn>
+                              </p:par>
+                            </p:childTnLst>
+                          </p:cTn>
+                        </p:par>
+                      </p:childTnLst>
+                    </p:cTn>
+                  </p:par>
+                  <p:par>
+                    <p:cTn id="7" fill="hold">
+                      <p:stCondLst>
+                        <p:cond delay="indefinite"/>
+                      </p:stCondLst>
+                      <p:childTnLst>
+                        <p:par>
+                          <p:cTn id="8" fill="hold">
+                            <p:stCondLst>
+                              <p:cond delay="0"/>
+                            </p:stCondLst>
+                            <p:childTnLst>
+                              <p:par>
+                                <p:cTn id="9" presetID="1" presetClass="entr" presetSubtype="0" fill="hold" grpId="0" nodeType="clickEffect">
+                                  <p:stCondLst>
+                                    <p:cond delay="0"/>
+                                  </p:stCondLst>
+                                  <p:childTnLst>
+                                    <p:set>
+                                      <p:cBhvr>
+                                        <p:cTn id="10" dur="1" fill="hold">
+                                          <p:stCondLst>
+                                            <p:cond delay="0"/>
+                                          </p:stCondLst>
+                                        </p:cTn>
+                                        <p:tgtEl>
+                                          <p:spTgt spid="6"/>
                                         </p:tgtEl>
                                         <p:attrNameLst>
                                           <p:attrName>style.visibility</p:attrName>
@@ -6887,7 +7290,97 @@
                                           </p:stCondLst>
                                         </p:cTn>
                                         <p:tgtEl>
-                                          <p:spTgt spid="6"/>
+                                          <p:spTgt spid="4"/>
+                                        </p:tgtEl>
+                                        <p:attrNameLst>
+                                          <p:attrName>style.visibility</p:attrName>
+                                        </p:attrNameLst>
+                                      </p:cBhvr>
+                                      <p:to>
+                                        <p:strVal val="visible"/>
+                                      </p:to>
+                                    </p:set>
+                                  </p:childTnLst>
+                                </p:cTn>
+                              </p:par>
+                            </p:childTnLst>
+                          </p:cTn>
+                        </p:par>
+                      </p:childTnLst>
+                    </p:cTn>
+                  </p:par>
+                  <p:par>
+                    <p:cTn id="15" fill="hold">
+                      <p:stCondLst>
+                        <p:cond delay="indefinite"/>
+                      </p:stCondLst>
+                      <p:childTnLst>
+                        <p:par>
+                          <p:cTn id="16" fill="hold">
+                            <p:stCondLst>
+                              <p:cond delay="0"/>
+                            </p:stCondLst>
+                            <p:childTnLst>
+                              <p:par>
+                                <p:cTn id="17" presetID="1" presetClass="entr" presetSubtype="0" fill="hold" grpId="0" nodeType="clickEffect">
+                                  <p:stCondLst>
+                                    <p:cond delay="0"/>
+                                  </p:stCondLst>
+                                  <p:childTnLst>
+                                    <p:set>
+                                      <p:cBhvr>
+                                        <p:cTn id="18" dur="1" fill="hold">
+                                          <p:stCondLst>
+                                            <p:cond delay="0"/>
+                                          </p:stCondLst>
+                                        </p:cTn>
+                                        <p:tgtEl>
+                                          <p:spTgt spid="5"/>
+                                        </p:tgtEl>
+                                        <p:attrNameLst>
+                                          <p:attrName>style.visibility</p:attrName>
+                                        </p:attrNameLst>
+                                      </p:cBhvr>
+                                      <p:to>
+                                        <p:strVal val="visible"/>
+                                      </p:to>
+                                    </p:set>
+                                  </p:childTnLst>
+                                </p:cTn>
+                              </p:par>
+                            </p:childTnLst>
+                          </p:cTn>
+                        </p:par>
+                      </p:childTnLst>
+                    </p:cTn>
+                  </p:par>
+                  <p:par>
+                    <p:cTn id="19" fill="hold">
+                      <p:stCondLst>
+                        <p:cond delay="indefinite"/>
+                      </p:stCondLst>
+                      <p:childTnLst>
+                        <p:par>
+                          <p:cTn id="20" fill="hold">
+                            <p:stCondLst>
+                              <p:cond delay="0"/>
+                            </p:stCondLst>
+                            <p:childTnLst>
+                              <p:par>
+                                <p:cTn id="21" presetID="1" presetClass="entr" presetSubtype="0" fill="hold" grpId="0" nodeType="clickEffect">
+                                  <p:stCondLst>
+                                    <p:cond delay="0"/>
+                                  </p:stCondLst>
+                                  <p:childTnLst>
+                                    <p:set>
+                                      <p:cBhvr>
+                                        <p:cTn id="22" dur="1" fill="hold">
+                                          <p:stCondLst>
+                                            <p:cond delay="0"/>
+                                          </p:stCondLst>
+                                        </p:cTn>
+                                        <p:tgtEl>
+                                          <p:spTgt spid="7"/>
                                         </p:tgtEl>
                                         <p:attrNameLst>
                                           <p:attrName>style.visibility</p:attrName>
@@ -6929,12 +7422,15 @@
     </p:tnLst>
     <p:bldLst>
       <p:bldP spid="6" grpId="0"/>
+      <p:bldP spid="4" grpId="0"/>
+      <p:bldP spid="5" grpId="0"/>
+      <p:bldP spid="7" grpId="0"/>
     </p:bldLst>
   </p:timing>
 </p:sld>
 </file>
 
-<file path=ppt/slides/slide11.xml><?xml version="1.0" encoding="utf-8"?>
+<file path=ppt/slides/slide13.xml><?xml version="1.0" encoding="utf-8"?>
 <p:sld xmlns:a="http://schemas.openxmlformats.org/drawingml/2006/main" xmlns:r="http://schemas.openxmlformats.org/officeDocument/2006/relationships" xmlns:p="http://schemas.openxmlformats.org/presentationml/2006/main">
   <p:cSld>
     <p:spTree>
@@ -6972,7 +7468,7 @@
             </a:pPr>
             <a:r>
               <a:rPr lang="zh-CN" altLang="en-US" dirty="0"/>
-              <a:t>所以，梯度下降算法的公式是什么？</a:t>
+              <a:t>所以，求一个函数的极小值点的算法（梯度下降算法）总结成公式是什么？</a:t>
             </a:r>
             <a:endParaRPr lang="en-US" altLang="zh-CN" dirty="0"/>
           </a:p>
@@ -6983,7 +7479,15 @@
             </a:pPr>
             <a:r>
               <a:rPr lang="zh-CN" altLang="en-US" dirty="0"/>
-              <a:t>根据梯度下降算法，损失函数的梯度下降算法的公式是什么？</a:t>
+              <a:t>求损失函数的极小值点的梯度下降算法总结</a:t>
+            </a:r>
+            <a:r>
+              <a:rPr lang="zh-CN" altLang="en-US"/>
+              <a:t>成公式是</a:t>
+            </a:r>
+            <a:r>
+              <a:rPr lang="zh-CN" altLang="en-US" dirty="0"/>
+              <a:t>什么？</a:t>
             </a:r>
             <a:endParaRPr lang="en-US" altLang="zh-CN" dirty="0"/>
           </a:p>
@@ -7072,7 +7576,7 @@
         </p:blipFill>
         <p:spPr>
           <a:xfrm>
-            <a:off x="4293956" y="4224020"/>
+            <a:off x="1300101" y="4392363"/>
             <a:ext cx="2844800" cy="1955800"/>
           </a:xfrm>
           <a:prstGeom prst="rect">
@@ -7108,7 +7612,7 @@
         </p:blipFill>
         <p:spPr>
           <a:xfrm>
-            <a:off x="3309076" y="2597150"/>
+            <a:off x="4716457" y="2597150"/>
             <a:ext cx="6235700" cy="1663700"/>
           </a:xfrm>
           <a:prstGeom prst="rect">
@@ -7296,7 +7800,7 @@
 </p:sld>
 </file>
 
-<file path=ppt/slides/slide12.xml><?xml version="1.0" encoding="utf-8"?>
+<file path=ppt/slides/slide14.xml><?xml version="1.0" encoding="utf-8"?>
 <p:sld xmlns:a="http://schemas.openxmlformats.org/drawingml/2006/main" xmlns:r="http://schemas.openxmlformats.org/officeDocument/2006/relationships" xmlns:p="http://schemas.openxmlformats.org/presentationml/2006/main">
   <p:cSld>
     <p:spTree>
@@ -7346,7 +7850,7 @@
 </p:sld>
 </file>
 
-<file path=ppt/slides/slide13.xml><?xml version="1.0" encoding="utf-8"?>
+<file path=ppt/slides/slide15.xml><?xml version="1.0" encoding="utf-8"?>
 <p:sld xmlns:a="http://schemas.openxmlformats.org/drawingml/2006/main" xmlns:r="http://schemas.openxmlformats.org/officeDocument/2006/relationships" xmlns:p="http://schemas.openxmlformats.org/presentationml/2006/main">
   <p:cSld>
     <p:spTree>
@@ -7512,129 +8016,6 @@
 </p:sld>
 </file>
 
-<file path=ppt/slides/slide14.xml><?xml version="1.0" encoding="utf-8"?>
-<p:sld xmlns:a="http://schemas.openxmlformats.org/drawingml/2006/main" xmlns:r="http://schemas.openxmlformats.org/officeDocument/2006/relationships" xmlns:p="http://schemas.openxmlformats.org/presentationml/2006/main">
-  <p:cSld>
-    <p:spTree>
-      <p:nvGrpSpPr>
-        <p:cNvPr id="1" name=""/>
-        <p:cNvGrpSpPr/>
-        <p:nvPr/>
-      </p:nvGrpSpPr>
-      <p:grpSpPr>
-        <a:xfrm>
-          <a:off x="0" y="0"/>
-          <a:ext cx="0" cy="0"/>
-          <a:chOff x="0" y="0"/>
-          <a:chExt cx="0" cy="0"/>
-        </a:xfrm>
-      </p:grpSpPr>
-      <p:sp>
-        <p:nvSpPr>
-          <p:cNvPr id="2" name="文本占位符 1"/>
-          <p:cNvSpPr>
-            <a:spLocks noGrp="1"/>
-          </p:cNvSpPr>
-          <p:nvPr>
-            <p:ph type="body" idx="1"/>
-          </p:nvPr>
-        </p:nvSpPr>
-        <p:spPr/>
-        <p:txBody>
-          <a:bodyPr/>
-          <a:lstStyle/>
-          <a:p>
-            <a:pPr marL="285750" indent="-285750">
-              <a:buFont typeface="Arial" panose="020B0604020202020204" pitchFamily="34" charset="0"/>
-              <a:buChar char="•"/>
-            </a:pPr>
-            <a:r>
-              <a:rPr lang="zh-CN" altLang="en-US" dirty="0"/>
-              <a:t>第二节课：“判断性别”</a:t>
-            </a:r>
-            <a:r>
-              <a:rPr lang="en-US" altLang="zh-CN" dirty="0"/>
-              <a:t>Demo</a:t>
-            </a:r>
-            <a:r>
-              <a:rPr lang="zh-CN" altLang="en-US" dirty="0"/>
-              <a:t>需求分析和初步设计（下</a:t>
-            </a:r>
-            <a:r>
-              <a:rPr lang="en-US" altLang="zh-CN" dirty="0"/>
-              <a:t>2</a:t>
-            </a:r>
-            <a:r>
-              <a:rPr lang="zh-CN" altLang="en-US" dirty="0"/>
-              <a:t>）</a:t>
-            </a:r>
-            <a:endParaRPr dirty="0">
-              <a:sym typeface="+mn-ea"/>
-            </a:endParaRPr>
-          </a:p>
-        </p:txBody>
-      </p:sp>
-      <p:sp>
-        <p:nvSpPr>
-          <p:cNvPr id="3" name="标题 2"/>
-          <p:cNvSpPr>
-            <a:spLocks noGrp="1"/>
-          </p:cNvSpPr>
-          <p:nvPr>
-            <p:ph type="title"/>
-          </p:nvPr>
-        </p:nvSpPr>
-        <p:spPr/>
-        <p:txBody>
-          <a:bodyPr/>
-          <a:lstStyle/>
-          <a:p>
-            <a:r>
-              <a:rPr lang="zh-CN" altLang="en-US"/>
-              <a:t>下节课预告</a:t>
-            </a:r>
-          </a:p>
-        </p:txBody>
-      </p:sp>
-    </p:spTree>
-    <p:custDataLst>
-      <p:tags r:id="rId1"/>
-    </p:custDataLst>
-  </p:cSld>
-  <p:clrMapOvr>
-    <a:masterClrMapping/>
-  </p:clrMapOvr>
-</p:sld>
-</file>
-
-<file path=ppt/slides/slide15.xml><?xml version="1.0" encoding="utf-8"?>
-<p:sld xmlns:a="http://schemas.openxmlformats.org/drawingml/2006/main" xmlns:r="http://schemas.openxmlformats.org/officeDocument/2006/relationships" xmlns:p="http://schemas.openxmlformats.org/presentationml/2006/main">
-  <p:cSld>
-    <p:spTree>
-      <p:nvGrpSpPr>
-        <p:cNvPr id="1" name=""/>
-        <p:cNvGrpSpPr/>
-        <p:nvPr/>
-      </p:nvGrpSpPr>
-      <p:grpSpPr>
-        <a:xfrm>
-          <a:off x="0" y="0"/>
-          <a:ext cx="0" cy="0"/>
-          <a:chOff x="0" y="0"/>
-          <a:chExt cx="0" cy="0"/>
-        </a:xfrm>
-      </p:grpSpPr>
-    </p:spTree>
-    <p:custDataLst>
-      <p:tags r:id="rId1"/>
-    </p:custDataLst>
-  </p:cSld>
-  <p:clrMapOvr>
-    <a:masterClrMapping/>
-  </p:clrMapOvr>
-</p:sld>
-</file>
-
 <file path=ppt/slides/slide16.xml><?xml version="1.0" encoding="utf-8"?>
 <p:sld xmlns:a="http://schemas.openxmlformats.org/drawingml/2006/main" xmlns:r="http://schemas.openxmlformats.org/officeDocument/2006/relationships" xmlns:p="http://schemas.openxmlformats.org/presentationml/2006/main">
   <p:cSld>
@@ -7673,23 +8054,27 @@
             </a:pPr>
             <a:r>
               <a:rPr lang="zh-CN" altLang="en-US" dirty="0"/>
-              <a:t>如何避免陷入局部最优？</a:t>
-            </a:r>
-            <a:br>
+              <a:t>第二节课：“判断性别”</a:t>
+            </a:r>
+            <a:r>
               <a:rPr lang="en-US" altLang="zh-CN" dirty="0"/>
-            </a:br>
+              <a:t>Demo</a:t>
+            </a:r>
             <a:r>
               <a:rPr lang="zh-CN" altLang="en-US" dirty="0"/>
-              <a:t>再取一组值来判断；</a:t>
-            </a:r>
-            <a:br>
+              <a:t>需求分析和初步设计（下</a:t>
+            </a:r>
+            <a:r>
               <a:rPr lang="en-US" altLang="zh-CN" dirty="0"/>
-            </a:br>
+              <a:t>2</a:t>
+            </a:r>
             <a:r>
               <a:rPr lang="zh-CN" altLang="en-US" dirty="0"/>
-              <a:t>小批量随机梯度下降</a:t>
-            </a:r>
-            <a:endParaRPr lang="en-US" altLang="zh-CN" dirty="0"/>
+              <a:t>）</a:t>
+            </a:r>
+            <a:endParaRPr dirty="0">
+              <a:sym typeface="+mn-ea"/>
+            </a:endParaRPr>
           </a:p>
         </p:txBody>
       </p:sp>
@@ -7710,7 +8095,7 @@
           <a:p>
             <a:r>
               <a:rPr lang="zh-CN" altLang="en-US"/>
-              <a:t>问答</a:t>
+              <a:t>下节课预告</a:t>
             </a:r>
           </a:p>
         </p:txBody>
@@ -7727,6 +8112,125 @@
 </file>
 
 <file path=ppt/slides/slide17.xml><?xml version="1.0" encoding="utf-8"?>
+<p:sld xmlns:a="http://schemas.openxmlformats.org/drawingml/2006/main" xmlns:r="http://schemas.openxmlformats.org/officeDocument/2006/relationships" xmlns:p="http://schemas.openxmlformats.org/presentationml/2006/main">
+  <p:cSld>
+    <p:spTree>
+      <p:nvGrpSpPr>
+        <p:cNvPr id="1" name=""/>
+        <p:cNvGrpSpPr/>
+        <p:nvPr/>
+      </p:nvGrpSpPr>
+      <p:grpSpPr>
+        <a:xfrm>
+          <a:off x="0" y="0"/>
+          <a:ext cx="0" cy="0"/>
+          <a:chOff x="0" y="0"/>
+          <a:chExt cx="0" cy="0"/>
+        </a:xfrm>
+      </p:grpSpPr>
+    </p:spTree>
+    <p:custDataLst>
+      <p:tags r:id="rId1"/>
+    </p:custDataLst>
+  </p:cSld>
+  <p:clrMapOvr>
+    <a:masterClrMapping/>
+  </p:clrMapOvr>
+</p:sld>
+</file>
+
+<file path=ppt/slides/slide18.xml><?xml version="1.0" encoding="utf-8"?>
+<p:sld xmlns:a="http://schemas.openxmlformats.org/drawingml/2006/main" xmlns:r="http://schemas.openxmlformats.org/officeDocument/2006/relationships" xmlns:p="http://schemas.openxmlformats.org/presentationml/2006/main">
+  <p:cSld>
+    <p:spTree>
+      <p:nvGrpSpPr>
+        <p:cNvPr id="1" name=""/>
+        <p:cNvGrpSpPr/>
+        <p:nvPr/>
+      </p:nvGrpSpPr>
+      <p:grpSpPr>
+        <a:xfrm>
+          <a:off x="0" y="0"/>
+          <a:ext cx="0" cy="0"/>
+          <a:chOff x="0" y="0"/>
+          <a:chExt cx="0" cy="0"/>
+        </a:xfrm>
+      </p:grpSpPr>
+      <p:sp>
+        <p:nvSpPr>
+          <p:cNvPr id="2" name="文本占位符 1"/>
+          <p:cNvSpPr>
+            <a:spLocks noGrp="1"/>
+          </p:cNvSpPr>
+          <p:nvPr>
+            <p:ph type="body" idx="1"/>
+          </p:nvPr>
+        </p:nvSpPr>
+        <p:spPr/>
+        <p:txBody>
+          <a:bodyPr/>
+          <a:lstStyle/>
+          <a:p>
+            <a:pPr marL="285750" indent="-285750">
+              <a:buFont typeface="Arial" panose="020B0604020202020204" pitchFamily="34" charset="0"/>
+              <a:buChar char="•"/>
+            </a:pPr>
+            <a:r>
+              <a:rPr lang="zh-CN" altLang="en-US" dirty="0"/>
+              <a:t>如何避免陷入局部最优？</a:t>
+            </a:r>
+            <a:br>
+              <a:rPr lang="en-US" altLang="zh-CN" dirty="0"/>
+            </a:br>
+            <a:r>
+              <a:rPr lang="zh-CN" altLang="en-US" dirty="0"/>
+              <a:t>再取一组值来判断；</a:t>
+            </a:r>
+            <a:br>
+              <a:rPr lang="en-US" altLang="zh-CN" dirty="0"/>
+            </a:br>
+            <a:r>
+              <a:rPr lang="zh-CN" altLang="en-US" dirty="0"/>
+              <a:t>小批量随机梯度下降</a:t>
+            </a:r>
+            <a:endParaRPr lang="en-US" altLang="zh-CN" dirty="0"/>
+          </a:p>
+        </p:txBody>
+      </p:sp>
+      <p:sp>
+        <p:nvSpPr>
+          <p:cNvPr id="3" name="标题 2"/>
+          <p:cNvSpPr>
+            <a:spLocks noGrp="1"/>
+          </p:cNvSpPr>
+          <p:nvPr>
+            <p:ph type="title"/>
+          </p:nvPr>
+        </p:nvSpPr>
+        <p:spPr/>
+        <p:txBody>
+          <a:bodyPr/>
+          <a:lstStyle/>
+          <a:p>
+            <a:r>
+              <a:rPr lang="zh-CN" altLang="en-US"/>
+              <a:t>问答</a:t>
+            </a:r>
+          </a:p>
+        </p:txBody>
+      </p:sp>
+    </p:spTree>
+    <p:custDataLst>
+      <p:tags r:id="rId1"/>
+    </p:custDataLst>
+  </p:cSld>
+  <p:clrMapOvr>
+    <a:masterClrMapping/>
+  </p:clrMapOvr>
+</p:sld>
+</file>
+
+<file path=ppt/slides/slide19.xml><?xml version="1.0" encoding="utf-8"?>
 <p:sld xmlns:a="http://schemas.openxmlformats.org/drawingml/2006/main" xmlns:r="http://schemas.openxmlformats.org/officeDocument/2006/relationships" xmlns:p="http://schemas.openxmlformats.org/presentationml/2006/main">
   <p:cSld>
     <p:spTree>
@@ -8695,7 +9199,7 @@
             <a:endParaRPr lang="en-US" altLang="zh-CN" dirty="0"/>
           </a:p>
           <a:p>
-            <a:pPr marL="742950" lvl="1" indent="-285750">
+            <a:pPr marL="1200150" lvl="2" indent="-285750">
               <a:buFont typeface="Arial" panose="020B0604020202020204" pitchFamily="34" charset="0"/>
               <a:buChar char="•"/>
             </a:pPr>
@@ -8856,7 +9360,7 @@
         </p:nvSpPr>
         <p:spPr>
           <a:xfrm>
-            <a:off x="4398176" y="5367461"/>
+            <a:off x="4235751" y="5441156"/>
             <a:ext cx="7956249" cy="369332"/>
           </a:xfrm>
           <a:prstGeom prst="rect">
@@ -9333,7 +9837,7 @@
             </a:pPr>
             <a:r>
               <a:rPr lang="zh-CN" altLang="en-US" dirty="0"/>
-              <a:t>因此，我们引入损失函数𝐸，用来在训练阶段度量在推理阶段的输出值和真实值的误差大小</a:t>
+              <a:t>因此，在训练时需要得到一组合适的权重、偏移，使得每个样本推理的输出值尽量接近真实值</a:t>
             </a:r>
             <a:endParaRPr lang="en-US" altLang="zh-CN" dirty="0"/>
           </a:p>
@@ -9344,26 +9848,7 @@
             </a:pPr>
             <a:r>
               <a:rPr lang="zh-CN" altLang="en-US" dirty="0"/>
-              <a:t>损失函数满足什么条件，就能达成希望的结果？</a:t>
-            </a:r>
-            <a:endParaRPr lang="en-US" altLang="zh-CN" dirty="0"/>
-          </a:p>
-          <a:p>
-            <a:pPr marL="285750" indent="-285750">
-              <a:buFont typeface="Arial" panose="020B0604020202020204" pitchFamily="34" charset="0"/>
-              <a:buChar char="•"/>
-            </a:pPr>
-            <a:r>
-              <a:rPr lang="zh-CN" altLang="en-US" dirty="0"/>
-              <a:t>对于“判断性别”的</a:t>
-            </a:r>
-            <a:r>
-              <a:rPr lang="en-US" altLang="zh-CN" dirty="0"/>
-              <a:t>Demo</a:t>
-            </a:r>
-            <a:r>
-              <a:rPr lang="zh-CN" altLang="en-US" dirty="0"/>
-              <a:t>，𝐸可以是什么函数？</a:t>
+              <a:t>那么，如何具体判断得到的一组权重、偏移是合适的呢？</a:t>
             </a:r>
             <a:endParaRPr lang="en-US" altLang="zh-CN" dirty="0"/>
           </a:p>
@@ -9415,7 +9900,7 @@
           <a:p>
             <a:r>
               <a:rPr lang="zh-CN" altLang="en-US" dirty="0"/>
-              <a:t>主问题：什么是损失函数</a:t>
+              <a:t>为什么引入损失函数？</a:t>
             </a:r>
           </a:p>
         </p:txBody>
@@ -9434,8 +9919,8 @@
         </p:nvSpPr>
         <p:spPr>
           <a:xfrm>
-            <a:off x="7529885" y="3179663"/>
-            <a:ext cx="2733347" cy="369332"/>
+            <a:off x="2456953" y="3903027"/>
+            <a:ext cx="8691411" cy="369332"/>
           </a:xfrm>
           <a:prstGeom prst="rect">
             <a:avLst/>
@@ -9449,91 +9934,20 @@
           <a:lstStyle/>
           <a:p>
             <a:r>
-              <a:rPr kumimoji="1" lang="zh-CN" altLang="en-US" dirty="0"/>
-              <a:t>返回的值（误差）最小</a:t>
-            </a:r>
+              <a:rPr lang="zh-CN" altLang="en-US" dirty="0"/>
+              <a:t>需要引入损失函数𝐸，用来在训练阶段度量在推理阶段的输出值和真实值的误差大小</a:t>
+            </a:r>
+            <a:endParaRPr lang="en-US" altLang="zh-CN" dirty="0"/>
           </a:p>
         </p:txBody>
       </p:sp>
-      <p:sp>
-        <p:nvSpPr>
-          <p:cNvPr id="4" name="文本框 3">
-            <a:extLst>
-              <a:ext uri="{FF2B5EF4-FFF2-40B4-BE49-F238E27FC236}">
-                <a16:creationId xmlns:a16="http://schemas.microsoft.com/office/drawing/2014/main" id="{9CDB625E-411B-3CC0-A498-B3BCD82FA321}"/>
-              </a:ext>
-            </a:extLst>
-          </p:cNvPr>
-          <p:cNvSpPr txBox="1"/>
-          <p:nvPr/>
-        </p:nvSpPr>
-        <p:spPr>
-          <a:xfrm>
-            <a:off x="5202748" y="4026610"/>
-            <a:ext cx="2804539" cy="369332"/>
-          </a:xfrm>
-          <a:prstGeom prst="rect">
-            <a:avLst/>
-          </a:prstGeom>
-          <a:noFill/>
-        </p:spPr>
-        <p:txBody>
-          <a:bodyPr wrap="square" rtlCol="0">
-            <a:spAutoFit/>
-          </a:bodyPr>
-          <a:lstStyle/>
-          <a:p>
-            <a:r>
-              <a:rPr kumimoji="1" lang="zh-CN" altLang="en-US" dirty="0"/>
-              <a:t>均方误差公式：</a:t>
-            </a:r>
-            <a:endParaRPr kumimoji="1" lang="en-US" altLang="zh-CN" dirty="0"/>
-          </a:p>
-        </p:txBody>
-      </p:sp>
-      <p:pic>
-        <p:nvPicPr>
-          <p:cNvPr id="11" name="图片 10">
-            <a:extLst>
-              <a:ext uri="{FF2B5EF4-FFF2-40B4-BE49-F238E27FC236}">
-                <a16:creationId xmlns:a16="http://schemas.microsoft.com/office/drawing/2014/main" id="{F9C62C3E-4042-77FA-9FC5-2A1F4F070CF6}"/>
-              </a:ext>
-            </a:extLst>
-          </p:cNvPr>
-          <p:cNvPicPr>
-            <a:picLocks noChangeAspect="1"/>
-          </p:cNvPicPr>
-          <p:nvPr/>
-        </p:nvPicPr>
-        <p:blipFill>
-          <a:blip r:embed="rId3">
-            <a:extLst>
-              <a:ext uri="{28A0092B-C50C-407E-A947-70E740481C1C}">
-                <a14:useLocalDpi xmlns:a14="http://schemas.microsoft.com/office/drawing/2010/main" val="0"/>
-              </a:ext>
-            </a:extLst>
-          </a:blip>
-          <a:stretch>
-            <a:fillRect/>
-          </a:stretch>
-        </p:blipFill>
-        <p:spPr>
-          <a:xfrm>
-            <a:off x="5202748" y="4356407"/>
-            <a:ext cx="6032500" cy="1016000"/>
-          </a:xfrm>
-          <a:prstGeom prst="rect">
-            <a:avLst/>
-          </a:prstGeom>
-        </p:spPr>
-      </p:pic>
     </p:spTree>
     <p:custDataLst>
       <p:tags r:id="rId1"/>
     </p:custDataLst>
     <p:extLst>
       <p:ext uri="{BB962C8B-B14F-4D97-AF65-F5344CB8AC3E}">
-        <p14:creationId xmlns:p14="http://schemas.microsoft.com/office/powerpoint/2010/main" val="892019450"/>
+        <p14:creationId xmlns:p14="http://schemas.microsoft.com/office/powerpoint/2010/main" val="2141732138"/>
       </p:ext>
     </p:extLst>
   </p:cSld>
@@ -9691,6 +10105,396 @@
                       </p:childTnLst>
                     </p:cTn>
                   </p:par>
+                </p:childTnLst>
+              </p:cTn>
+              <p:prevCondLst>
+                <p:cond evt="onPrev" delay="0">
+                  <p:tgtEl>
+                    <p:sldTgt/>
+                  </p:tgtEl>
+                </p:cond>
+              </p:prevCondLst>
+              <p:nextCondLst>
+                <p:cond evt="onNext" delay="0">
+                  <p:tgtEl>
+                    <p:sldTgt/>
+                  </p:tgtEl>
+                </p:cond>
+              </p:nextCondLst>
+            </p:seq>
+          </p:childTnLst>
+        </p:cTn>
+      </p:par>
+    </p:tnLst>
+    <p:bldLst>
+      <p:bldP spid="5" grpId="0"/>
+    </p:bldLst>
+  </p:timing>
+</p:sld>
+</file>
+
+<file path=ppt/slides/slide8.xml><?xml version="1.0" encoding="utf-8"?>
+<p:sld xmlns:a="http://schemas.openxmlformats.org/drawingml/2006/main" xmlns:r="http://schemas.openxmlformats.org/officeDocument/2006/relationships" xmlns:p="http://schemas.openxmlformats.org/presentationml/2006/main">
+  <p:cSld>
+    <p:spTree>
+      <p:nvGrpSpPr>
+        <p:cNvPr id="1" name=""/>
+        <p:cNvGrpSpPr/>
+        <p:nvPr/>
+      </p:nvGrpSpPr>
+      <p:grpSpPr>
+        <a:xfrm>
+          <a:off x="0" y="0"/>
+          <a:ext cx="0" cy="0"/>
+          <a:chOff x="0" y="0"/>
+          <a:chExt cx="0" cy="0"/>
+        </a:xfrm>
+      </p:grpSpPr>
+      <p:sp>
+        <p:nvSpPr>
+          <p:cNvPr id="2" name="文本占位符 1"/>
+          <p:cNvSpPr>
+            <a:spLocks noGrp="1"/>
+          </p:cNvSpPr>
+          <p:nvPr>
+            <p:ph type="body" idx="1"/>
+          </p:nvPr>
+        </p:nvSpPr>
+        <p:spPr/>
+        <p:txBody>
+          <a:bodyPr/>
+          <a:lstStyle/>
+          <a:p>
+            <a:pPr marL="285750" indent="-285750">
+              <a:buFont typeface="Arial" panose="020B0604020202020204" pitchFamily="34" charset="0"/>
+              <a:buChar char="•"/>
+            </a:pPr>
+            <a:r>
+              <a:rPr lang="zh-CN" altLang="en-US" dirty="0"/>
+              <a:t>损失函数的表达式是什么？</a:t>
+            </a:r>
+            <a:endParaRPr lang="en-US" altLang="zh-CN" dirty="0"/>
+          </a:p>
+          <a:p>
+            <a:pPr marL="742950" lvl="1" indent="-285750">
+              <a:buFont typeface="Arial" panose="020B0604020202020204" pitchFamily="34" charset="0"/>
+              <a:buChar char="•"/>
+            </a:pPr>
+            <a:r>
+              <a:rPr lang="zh-CN" altLang="en-US" dirty="0"/>
+              <a:t>值是什么？</a:t>
+            </a:r>
+            <a:endParaRPr lang="en-US" altLang="zh-CN" dirty="0"/>
+          </a:p>
+          <a:p>
+            <a:pPr marL="742950" lvl="1" indent="-285750">
+              <a:buFont typeface="Arial" panose="020B0604020202020204" pitchFamily="34" charset="0"/>
+              <a:buChar char="•"/>
+            </a:pPr>
+            <a:r>
+              <a:rPr lang="zh-CN" altLang="en-US" dirty="0"/>
+              <a:t>自变量、常量分别是什么？</a:t>
+            </a:r>
+            <a:endParaRPr lang="en-US" altLang="zh-CN" dirty="0"/>
+          </a:p>
+          <a:p>
+            <a:pPr marL="742950" lvl="1" indent="-285750">
+              <a:buFont typeface="Arial" panose="020B0604020202020204" pitchFamily="34" charset="0"/>
+              <a:buChar char="•"/>
+            </a:pPr>
+            <a:r>
+              <a:rPr lang="zh-CN" altLang="en-US" dirty="0"/>
+              <a:t>表达式是什么？</a:t>
+            </a:r>
+            <a:endParaRPr lang="en-US" altLang="zh-CN" dirty="0"/>
+          </a:p>
+          <a:p>
+            <a:pPr marL="742950" lvl="1" indent="-285750">
+              <a:buFont typeface="Arial" panose="020B0604020202020204" pitchFamily="34" charset="0"/>
+              <a:buChar char="•"/>
+            </a:pPr>
+            <a:endParaRPr lang="en-US" altLang="zh-CN" dirty="0"/>
+          </a:p>
+          <a:p>
+            <a:endParaRPr lang="en-US" altLang="zh-CN" dirty="0"/>
+          </a:p>
+          <a:p>
+            <a:endParaRPr lang="en-US" altLang="zh-CN" dirty="0"/>
+          </a:p>
+          <a:p>
+            <a:pPr marL="285750" indent="-285750">
+              <a:buFont typeface="Arial" panose="020B0604020202020204" pitchFamily="34" charset="0"/>
+              <a:buChar char="•"/>
+            </a:pPr>
+            <a:r>
+              <a:rPr lang="zh-CN" altLang="en-US" dirty="0"/>
+              <a:t>自学、互学、展学</a:t>
+            </a:r>
+          </a:p>
+          <a:p>
+            <a:pPr marL="285750" indent="-285750">
+              <a:buFont typeface="Arial" panose="020B0604020202020204" pitchFamily="34" charset="0"/>
+              <a:buChar char="•"/>
+            </a:pPr>
+            <a:endParaRPr lang="en-US" altLang="zh-CN" dirty="0"/>
+          </a:p>
+          <a:p>
+            <a:pPr marL="285750" indent="-285750">
+              <a:buFont typeface="Arial" panose="020B0604020202020204" pitchFamily="34" charset="0"/>
+              <a:buChar char="•"/>
+            </a:pPr>
+            <a:endParaRPr dirty="0">
+              <a:sym typeface="+mn-ea"/>
+            </a:endParaRPr>
+          </a:p>
+        </p:txBody>
+      </p:sp>
+      <p:sp>
+        <p:nvSpPr>
+          <p:cNvPr id="3" name="标题 2"/>
+          <p:cNvSpPr>
+            <a:spLocks noGrp="1"/>
+          </p:cNvSpPr>
+          <p:nvPr>
+            <p:ph type="title"/>
+          </p:nvPr>
+        </p:nvSpPr>
+        <p:spPr/>
+        <p:txBody>
+          <a:bodyPr/>
+          <a:lstStyle/>
+          <a:p>
+            <a:r>
+              <a:rPr lang="zh-CN" altLang="en-US" dirty="0"/>
+              <a:t>主问题：什么是损失函数</a:t>
+            </a:r>
+          </a:p>
+        </p:txBody>
+      </p:sp>
+      <p:sp>
+        <p:nvSpPr>
+          <p:cNvPr id="5" name="文本框 4">
+            <a:extLst>
+              <a:ext uri="{FF2B5EF4-FFF2-40B4-BE49-F238E27FC236}">
+                <a16:creationId xmlns:a16="http://schemas.microsoft.com/office/drawing/2014/main" id="{047D079F-C248-EF2A-2DEB-18F7A634B2BE}"/>
+              </a:ext>
+            </a:extLst>
+          </p:cNvPr>
+          <p:cNvSpPr txBox="1"/>
+          <p:nvPr/>
+        </p:nvSpPr>
+        <p:spPr>
+          <a:xfrm>
+            <a:off x="7735579" y="3718361"/>
+            <a:ext cx="2733347" cy="369332"/>
+          </a:xfrm>
+          <a:prstGeom prst="rect">
+            <a:avLst/>
+          </a:prstGeom>
+          <a:noFill/>
+        </p:spPr>
+        <p:txBody>
+          <a:bodyPr wrap="square" rtlCol="0">
+            <a:spAutoFit/>
+          </a:bodyPr>
+          <a:lstStyle/>
+          <a:p>
+            <a:r>
+              <a:rPr lang="zh-CN" altLang="en-US" dirty="0"/>
+              <a:t>𝑒</a:t>
+            </a:r>
+            <a:r>
+              <a:rPr lang="en-US" altLang="zh-CN" dirty="0"/>
+              <a:t>=</a:t>
+            </a:r>
+            <a:r>
+              <a:rPr lang="zh-CN" altLang="en-US" dirty="0"/>
+              <a:t>𝐸</a:t>
+            </a:r>
+            <a:r>
+              <a:rPr lang="en-US" altLang="zh-CN" dirty="0"/>
+              <a:t>(</a:t>
+            </a:r>
+            <a:r>
+              <a:rPr lang="zh-CN" altLang="en-US" dirty="0"/>
+              <a:t>𝑦输出</a:t>
+            </a:r>
+            <a:r>
+              <a:rPr lang="en-US" altLang="zh-CN" dirty="0"/>
+              <a:t>)</a:t>
+            </a:r>
+            <a:endParaRPr kumimoji="1" lang="zh-CN" altLang="en-US" dirty="0"/>
+          </a:p>
+        </p:txBody>
+      </p:sp>
+    </p:spTree>
+    <p:custDataLst>
+      <p:tags r:id="rId1"/>
+    </p:custDataLst>
+    <p:extLst>
+      <p:ext uri="{BB962C8B-B14F-4D97-AF65-F5344CB8AC3E}">
+        <p14:creationId xmlns:p14="http://schemas.microsoft.com/office/powerpoint/2010/main" val="892019450"/>
+      </p:ext>
+    </p:extLst>
+  </p:cSld>
+  <p:clrMapOvr>
+    <a:masterClrMapping/>
+  </p:clrMapOvr>
+  <p:timing>
+    <p:tnLst>
+      <p:par>
+        <p:cTn id="1" dur="indefinite" restart="never" nodeType="tmRoot">
+          <p:childTnLst>
+            <p:seq concurrent="1" nextAc="seek">
+              <p:cTn id="2" dur="indefinite" nodeType="mainSeq">
+                <p:childTnLst>
+                  <p:par>
+                    <p:cTn id="3" fill="hold">
+                      <p:stCondLst>
+                        <p:cond delay="indefinite"/>
+                      </p:stCondLst>
+                      <p:childTnLst>
+                        <p:par>
+                          <p:cTn id="4" fill="hold">
+                            <p:stCondLst>
+                              <p:cond delay="0"/>
+                            </p:stCondLst>
+                            <p:childTnLst>
+                              <p:par>
+                                <p:cTn id="5" presetID="1" presetClass="entr" presetSubtype="0" fill="hold" nodeType="clickEffect">
+                                  <p:stCondLst>
+                                    <p:cond delay="0"/>
+                                  </p:stCondLst>
+                                  <p:childTnLst>
+                                    <p:set>
+                                      <p:cBhvr>
+                                        <p:cTn id="6" dur="1" fill="hold">
+                                          <p:stCondLst>
+                                            <p:cond delay="0"/>
+                                          </p:stCondLst>
+                                        </p:cTn>
+                                        <p:tgtEl>
+                                          <p:spTgt spid="2">
+                                            <p:txEl>
+                                              <p:pRg st="0" end="0"/>
+                                            </p:txEl>
+                                          </p:spTgt>
+                                        </p:tgtEl>
+                                        <p:attrNameLst>
+                                          <p:attrName>style.visibility</p:attrName>
+                                        </p:attrNameLst>
+                                      </p:cBhvr>
+                                      <p:to>
+                                        <p:strVal val="visible"/>
+                                      </p:to>
+                                    </p:set>
+                                  </p:childTnLst>
+                                </p:cTn>
+                              </p:par>
+                            </p:childTnLst>
+                          </p:cTn>
+                        </p:par>
+                      </p:childTnLst>
+                    </p:cTn>
+                  </p:par>
+                  <p:par>
+                    <p:cTn id="7" fill="hold">
+                      <p:stCondLst>
+                        <p:cond delay="indefinite"/>
+                      </p:stCondLst>
+                      <p:childTnLst>
+                        <p:par>
+                          <p:cTn id="8" fill="hold">
+                            <p:stCondLst>
+                              <p:cond delay="0"/>
+                            </p:stCondLst>
+                            <p:childTnLst>
+                              <p:par>
+                                <p:cTn id="9" presetID="1" presetClass="entr" presetSubtype="0" fill="hold" nodeType="clickEffect">
+                                  <p:stCondLst>
+                                    <p:cond delay="0"/>
+                                  </p:stCondLst>
+                                  <p:childTnLst>
+                                    <p:set>
+                                      <p:cBhvr>
+                                        <p:cTn id="10" dur="1" fill="hold">
+                                          <p:stCondLst>
+                                            <p:cond delay="0"/>
+                                          </p:stCondLst>
+                                        </p:cTn>
+                                        <p:tgtEl>
+                                          <p:spTgt spid="2">
+                                            <p:txEl>
+                                              <p:pRg st="1" end="1"/>
+                                            </p:txEl>
+                                          </p:spTgt>
+                                        </p:tgtEl>
+                                        <p:attrNameLst>
+                                          <p:attrName>style.visibility</p:attrName>
+                                        </p:attrNameLst>
+                                      </p:cBhvr>
+                                      <p:to>
+                                        <p:strVal val="visible"/>
+                                      </p:to>
+                                    </p:set>
+                                  </p:childTnLst>
+                                </p:cTn>
+                              </p:par>
+                            </p:childTnLst>
+                          </p:cTn>
+                        </p:par>
+                      </p:childTnLst>
+                    </p:cTn>
+                  </p:par>
+                  <p:par>
+                    <p:cTn id="11" fill="hold">
+                      <p:stCondLst>
+                        <p:cond delay="indefinite"/>
+                      </p:stCondLst>
+                      <p:childTnLst>
+                        <p:par>
+                          <p:cTn id="12" fill="hold">
+                            <p:stCondLst>
+                              <p:cond delay="0"/>
+                            </p:stCondLst>
+                            <p:childTnLst>
+                              <p:par>
+                                <p:cTn id="13" presetID="1" presetClass="entr" presetSubtype="0" fill="hold" nodeType="clickEffect">
+                                  <p:stCondLst>
+                                    <p:cond delay="0"/>
+                                  </p:stCondLst>
+                                  <p:childTnLst>
+                                    <p:set>
+                                      <p:cBhvr>
+                                        <p:cTn id="14" dur="1" fill="hold">
+                                          <p:stCondLst>
+                                            <p:cond delay="0"/>
+                                          </p:stCondLst>
+                                        </p:cTn>
+                                        <p:tgtEl>
+                                          <p:spTgt spid="2">
+                                            <p:txEl>
+                                              <p:pRg st="2" end="2"/>
+                                            </p:txEl>
+                                          </p:spTgt>
+                                        </p:tgtEl>
+                                        <p:attrNameLst>
+                                          <p:attrName>style.visibility</p:attrName>
+                                        </p:attrNameLst>
+                                      </p:cBhvr>
+                                      <p:to>
+                                        <p:strVal val="visible"/>
+                                      </p:to>
+                                    </p:set>
+                                  </p:childTnLst>
+                                </p:cTn>
+                              </p:par>
+                            </p:childTnLst>
+                          </p:cTn>
+                        </p:par>
+                      </p:childTnLst>
+                    </p:cTn>
+                  </p:par>
                   <p:par>
                     <p:cTn id="15" fill="hold">
                       <p:stCondLst>
@@ -9719,7 +10523,7 @@
                                         <p:tgtEl>
                                           <p:spTgt spid="2">
                                             <p:txEl>
-                                              <p:pRg st="2" end="2"/>
+                                              <p:pRg st="3" end="3"/>
                                             </p:txEl>
                                           </p:spTgt>
                                         </p:tgtEl>
@@ -9766,52 +10570,7 @@
                                           </p:stCondLst>
                                         </p:cTn>
                                         <p:tgtEl>
-                                          <p:spTgt spid="4"/>
-                                        </p:tgtEl>
-                                        <p:attrNameLst>
-                                          <p:attrName>style.visibility</p:attrName>
-                                        </p:attrNameLst>
-                                      </p:cBhvr>
-                                      <p:to>
-                                        <p:strVal val="visible"/>
-                                      </p:to>
-                                    </p:set>
-                                  </p:childTnLst>
-                                </p:cTn>
-                              </p:par>
-                            </p:childTnLst>
-                          </p:cTn>
-                        </p:par>
-                      </p:childTnLst>
-                    </p:cTn>
-                  </p:par>
-                  <p:par>
-                    <p:cTn id="23" fill="hold">
-                      <p:stCondLst>
-                        <p:cond delay="indefinite"/>
-                      </p:stCondLst>
-                      <p:childTnLst>
-                        <p:par>
-                          <p:cTn id="24" fill="hold">
-                            <p:stCondLst>
-                              <p:cond delay="0"/>
-                            </p:stCondLst>
-                            <p:childTnLst>
-                              <p:par>
-                                <p:cTn id="25" presetID="1" presetClass="entr" presetSubtype="0" fill="hold" nodeType="clickEffect">
-                                  <p:stCondLst>
-                                    <p:cond delay="0"/>
-                                  </p:stCondLst>
-                                  <p:childTnLst>
-                                    <p:set>
-                                      <p:cBhvr>
-                                        <p:cTn id="26" dur="1" fill="hold">
-                                          <p:stCondLst>
-                                            <p:cond delay="0"/>
-                                          </p:stCondLst>
-                                        </p:cTn>
-                                        <p:tgtEl>
-                                          <p:spTgt spid="11"/>
+                                          <p:spTgt spid="5"/>
                                         </p:tgtEl>
                                         <p:attrNameLst>
                                           <p:attrName>style.visibility</p:attrName>
@@ -9853,73 +10612,8 @@
     </p:tnLst>
     <p:bldLst>
       <p:bldP spid="5" grpId="0"/>
-      <p:bldP spid="4" grpId="0"/>
     </p:bldLst>
   </p:timing>
-</p:sld>
-</file>
-
-<file path=ppt/slides/slide8.xml><?xml version="1.0" encoding="utf-8"?>
-<p:sld xmlns:a="http://schemas.openxmlformats.org/drawingml/2006/main" xmlns:r="http://schemas.openxmlformats.org/officeDocument/2006/relationships" xmlns:p="http://schemas.openxmlformats.org/presentationml/2006/main">
-  <p:cSld>
-    <p:spTree>
-      <p:nvGrpSpPr>
-        <p:cNvPr id="1" name=""/>
-        <p:cNvGrpSpPr/>
-        <p:nvPr/>
-      </p:nvGrpSpPr>
-      <p:grpSpPr>
-        <a:xfrm>
-          <a:off x="0" y="0"/>
-          <a:ext cx="0" cy="0"/>
-          <a:chOff x="0" y="0"/>
-          <a:chExt cx="0" cy="0"/>
-        </a:xfrm>
-      </p:grpSpPr>
-      <p:sp>
-        <p:nvSpPr>
-          <p:cNvPr id="2" name="标题 1"/>
-          <p:cNvSpPr>
-            <a:spLocks noGrp="1"/>
-          </p:cNvSpPr>
-          <p:nvPr>
-            <p:ph type="title"/>
-          </p:nvPr>
-        </p:nvSpPr>
-        <p:spPr/>
-        <p:txBody>
-          <a:bodyPr/>
-          <a:lstStyle/>
-          <a:p>
-            <a:r>
-              <a:rPr dirty="0">
-                <a:sym typeface="+mn-ea"/>
-              </a:rPr>
-              <a:t>主问题：</a:t>
-            </a:r>
-            <a:r>
-              <a:rPr lang="en-US" dirty="0" err="1">
-                <a:sym typeface="+mn-ea"/>
-              </a:rPr>
-              <a:t>什么是随机梯度下降</a:t>
-            </a:r>
-            <a:endParaRPr lang="zh-CN" altLang="en-US" dirty="0"/>
-          </a:p>
-        </p:txBody>
-      </p:sp>
-    </p:spTree>
-    <p:custDataLst>
-      <p:tags r:id="rId1"/>
-    </p:custDataLst>
-    <p:extLst>
-      <p:ext uri="{BB962C8B-B14F-4D97-AF65-F5344CB8AC3E}">
-        <p14:creationId xmlns:p14="http://schemas.microsoft.com/office/powerpoint/2010/main" val="2111602534"/>
-      </p:ext>
-    </p:extLst>
-  </p:cSld>
-  <p:clrMapOvr>
-    <a:masterClrMapping/>
-  </p:clrMapOvr>
 </p:sld>
 </file>
 
@@ -9940,125 +10634,267 @@
           <a:chExt cx="0" cy="0"/>
         </a:xfrm>
       </p:grpSpPr>
-      <p:sp>
-        <p:nvSpPr>
-          <p:cNvPr id="2" name="文本占位符 1"/>
-          <p:cNvSpPr>
-            <a:spLocks noGrp="1"/>
-          </p:cNvSpPr>
-          <p:nvPr>
-            <p:ph type="body" idx="1"/>
-          </p:nvPr>
-        </p:nvSpPr>
-        <p:spPr/>
-        <p:txBody>
-          <a:bodyPr/>
-          <a:lstStyle/>
-          <a:p>
-            <a:pPr marL="285750" indent="-285750">
-              <a:buFont typeface="Arial" panose="020B0604020202020204" pitchFamily="34" charset="0"/>
-              <a:buChar char="•"/>
-            </a:pPr>
-            <a:r>
-              <a:rPr lang="zh-CN" altLang="en-US" dirty="0"/>
-              <a:t>训练后得到的一组权重和偏移在损失函数中满足什么条件，使得误差最小？</a:t>
-            </a:r>
-            <a:endParaRPr lang="en-US" altLang="zh-CN" dirty="0"/>
-          </a:p>
-          <a:p>
-            <a:pPr marL="742950" lvl="1" indent="-285750">
-              <a:buFont typeface="Arial" panose="020B0604020202020204" pitchFamily="34" charset="0"/>
-              <a:buChar char="•"/>
-            </a:pPr>
-            <a:r>
-              <a:rPr lang="zh-CN" altLang="en-US" dirty="0"/>
-              <a:t>损失函数中，哪些已知量，哪些是未知量？</a:t>
-            </a:r>
-            <a:endParaRPr lang="en-US" altLang="zh-CN" dirty="0"/>
-          </a:p>
-          <a:p>
-            <a:pPr marL="742950" lvl="1" indent="-285750">
-              <a:buFont typeface="Arial" panose="020B0604020202020204" pitchFamily="34" charset="0"/>
-              <a:buChar char="•"/>
-            </a:pPr>
-            <a:r>
-              <a:rPr lang="zh-CN" altLang="en-US" dirty="0"/>
-              <a:t>权重和偏移是未知量吗？</a:t>
-            </a:r>
-            <a:endParaRPr lang="en-US" altLang="zh-CN" dirty="0"/>
-          </a:p>
-          <a:p>
-            <a:pPr marL="742950" lvl="1" indent="-285750">
-              <a:buFont typeface="Arial" panose="020B0604020202020204" pitchFamily="34" charset="0"/>
-              <a:buChar char="•"/>
-            </a:pPr>
-            <a:r>
-              <a:rPr lang="zh-CN" altLang="en-US"/>
-              <a:t>要求</a:t>
-            </a:r>
-            <a:r>
-              <a:rPr lang="zh-CN" altLang="en-US" dirty="0"/>
-              <a:t>最小误差，也就是求损失函数的最大值还是最小值？</a:t>
-            </a:r>
-            <a:endParaRPr lang="en-US" altLang="zh-CN" dirty="0"/>
-          </a:p>
-          <a:p>
-            <a:pPr marL="742950" lvl="1" indent="-285750">
-              <a:buFont typeface="Arial" panose="020B0604020202020204" pitchFamily="34" charset="0"/>
-              <a:buChar char="•"/>
-            </a:pPr>
-            <a:r>
-              <a:rPr lang="zh-CN" altLang="en-US" dirty="0"/>
-              <a:t>所以训练后得到的一组权重和偏移属于损失函数的最大值点还是最小值点？</a:t>
-            </a:r>
-            <a:endParaRPr lang="en-US" altLang="zh-CN" dirty="0"/>
-          </a:p>
-          <a:p>
-            <a:pPr marL="285750" indent="-285750">
-              <a:buFont typeface="Arial" panose="020B0604020202020204" pitchFamily="34" charset="0"/>
-              <a:buChar char="•"/>
-            </a:pPr>
-            <a:r>
-              <a:rPr lang="zh-CN" altLang="en-US" dirty="0"/>
-              <a:t>所以要求损失函数的最小值点</a:t>
-            </a:r>
-            <a:endParaRPr lang="en-US" altLang="zh-CN" dirty="0"/>
-          </a:p>
-          <a:p>
-            <a:pPr marL="285750" indent="-285750">
-              <a:buFont typeface="Arial" panose="020B0604020202020204" pitchFamily="34" charset="0"/>
-              <a:buChar char="•"/>
-            </a:pPr>
-            <a:endParaRPr lang="en-US" altLang="zh-CN" dirty="0"/>
-          </a:p>
-          <a:p>
-            <a:pPr marL="285750" indent="-285750">
-              <a:buFont typeface="Arial" panose="020B0604020202020204" pitchFamily="34" charset="0"/>
-              <a:buChar char="•"/>
-            </a:pPr>
-            <a:r>
-              <a:rPr lang="zh-CN" altLang="en-US" dirty="0"/>
-              <a:t>自学、互学、展学</a:t>
-            </a:r>
-          </a:p>
-          <a:p>
-            <a:pPr marL="285750" indent="-285750">
-              <a:buFont typeface="Arial" panose="020B0604020202020204" pitchFamily="34" charset="0"/>
-              <a:buChar char="•"/>
-            </a:pPr>
-            <a:endParaRPr lang="en-US" altLang="zh-CN" dirty="0"/>
-          </a:p>
-          <a:p>
-            <a:pPr marL="285750" indent="-285750">
-              <a:buFont typeface="Arial" panose="020B0604020202020204" pitchFamily="34" charset="0"/>
-              <a:buChar char="•"/>
-            </a:pPr>
-            <a:endParaRPr dirty="0">
-              <a:sym typeface="+mn-ea"/>
-            </a:endParaRPr>
-          </a:p>
-        </p:txBody>
-      </p:sp>
+      <mc:AlternateContent xmlns:mc="http://schemas.openxmlformats.org/markup-compatibility/2006">
+        <mc:Choice xmlns:a14="http://schemas.microsoft.com/office/drawing/2010/main" Requires="a14">
+          <p:sp>
+            <p:nvSpPr>
+              <p:cNvPr id="2" name="文本占位符 1"/>
+              <p:cNvSpPr>
+                <a:spLocks noGrp="1"/>
+              </p:cNvSpPr>
+              <p:nvPr>
+                <p:ph type="body" idx="1"/>
+              </p:nvPr>
+            </p:nvSpPr>
+            <p:spPr/>
+            <p:txBody>
+              <a:bodyPr/>
+              <a:lstStyle/>
+              <a:p>
+                <a:pPr marL="285750" indent="-285750">
+                  <a:buFont typeface="Arial" panose="020B0604020202020204" pitchFamily="34" charset="0"/>
+                  <a:buChar char="•"/>
+                </a:pPr>
+                <a:r>
+                  <a:rPr lang="zh-CN" altLang="en-US" dirty="0"/>
+                  <a:t>有了损失函数，如何具体判断得到的一组权重、偏移是合适的呢？</a:t>
+                </a:r>
+                <a:endParaRPr lang="en-US" altLang="zh-CN" dirty="0"/>
+              </a:p>
+              <a:p>
+                <a:pPr marL="742950" lvl="1" indent="-285750">
+                  <a:buFont typeface="Arial" panose="020B0604020202020204" pitchFamily="34" charset="0"/>
+                  <a:buChar char="•"/>
+                </a:pPr>
+                <a:r>
+                  <a:rPr lang="zh-CN" altLang="en-US" dirty="0"/>
+                  <a:t>希望得到损失函数的最大值还是最小值？</a:t>
+                </a:r>
+                <a:endParaRPr lang="en-US" altLang="zh-CN" dirty="0"/>
+              </a:p>
+              <a:p>
+                <a:pPr marL="742950" lvl="1" indent="-285750">
+                  <a:buFont typeface="Arial" panose="020B0604020202020204" pitchFamily="34" charset="0"/>
+                  <a:buChar char="•"/>
+                </a:pPr>
+                <a:r>
+                  <a:rPr lang="zh-CN" altLang="en-US" dirty="0"/>
+                  <a:t>此时的自变量（</a:t>
+                </a:r>
+                <a14:m>
+                  <m:oMath xmlns:m="http://schemas.openxmlformats.org/officeDocument/2006/math">
+                    <m:sSub>
+                      <m:sSubPr>
+                        <m:ctrlPr>
+                          <a:rPr lang="en-US" altLang="zh-CN" i="1">
+                            <a:latin typeface="Cambria Math" panose="02040503050406030204" pitchFamily="18" charset="0"/>
+                          </a:rPr>
+                        </m:ctrlPr>
+                      </m:sSubPr>
+                      <m:e>
+                        <m:r>
+                          <a:rPr lang="en-US" altLang="zh-CN" i="1">
+                            <a:latin typeface="Cambria Math" panose="02040503050406030204" pitchFamily="18" charset="0"/>
+                          </a:rPr>
+                          <m:t>𝑦</m:t>
+                        </m:r>
+                      </m:e>
+                      <m:sub>
+                        <m:r>
+                          <a:rPr lang="zh-CN" altLang="en-US" i="1">
+                            <a:latin typeface="Cambria Math" panose="02040503050406030204" pitchFamily="18" charset="0"/>
+                          </a:rPr>
+                          <m:t>输出</m:t>
+                        </m:r>
+                      </m:sub>
+                    </m:sSub>
+                    <m:r>
+                      <a:rPr lang="zh-CN" altLang="en-US" b="0" i="1" smtClean="0">
+                        <a:latin typeface="Cambria Math" panose="02040503050406030204" pitchFamily="18" charset="0"/>
+                      </a:rPr>
+                      <m:t>）</m:t>
+                    </m:r>
+                    <m:r>
+                      <a:rPr lang="zh-CN" altLang="en-US" i="1">
+                        <a:latin typeface="Cambria Math" panose="02040503050406030204" pitchFamily="18" charset="0"/>
+                      </a:rPr>
+                      <m:t>就是</m:t>
+                    </m:r>
+                    <m:r>
+                      <a:rPr lang="zh-CN" altLang="en-US" i="1">
+                        <a:latin typeface="Cambria Math" panose="02040503050406030204" pitchFamily="18" charset="0"/>
+                      </a:rPr>
+                      <m:t>合适</m:t>
+                    </m:r>
+                    <m:r>
+                      <a:rPr lang="zh-CN" altLang="en-US" i="1">
+                        <a:latin typeface="Cambria Math" panose="02040503050406030204" pitchFamily="18" charset="0"/>
+                      </a:rPr>
+                      <m:t>的</m:t>
+                    </m:r>
+                  </m:oMath>
+                </a14:m>
+                <a:r>
+                  <a:rPr lang="zh-CN" altLang="en-US" dirty="0"/>
+                  <a:t>的值</a:t>
+                </a:r>
+                <a:endParaRPr lang="en-US" altLang="zh-CN" dirty="0"/>
+              </a:p>
+              <a:p>
+                <a:pPr marL="742950" lvl="1" indent="-285750">
+                  <a:buFont typeface="Arial" panose="020B0604020202020204" pitchFamily="34" charset="0"/>
+                  <a:buChar char="•"/>
+                </a:pPr>
+                <a14:m>
+                  <m:oMath xmlns:m="http://schemas.openxmlformats.org/officeDocument/2006/math">
+                    <m:sSub>
+                      <m:sSubPr>
+                        <m:ctrlPr>
+                          <a:rPr lang="en-US" altLang="zh-CN" i="1">
+                            <a:latin typeface="Cambria Math" panose="02040503050406030204" pitchFamily="18" charset="0"/>
+                          </a:rPr>
+                        </m:ctrlPr>
+                      </m:sSubPr>
+                      <m:e>
+                        <m:r>
+                          <a:rPr lang="en-US" altLang="zh-CN" i="1">
+                            <a:latin typeface="Cambria Math" panose="02040503050406030204" pitchFamily="18" charset="0"/>
+                          </a:rPr>
+                          <m:t>𝑦</m:t>
+                        </m:r>
+                      </m:e>
+                      <m:sub>
+                        <m:r>
+                          <a:rPr lang="zh-CN" altLang="en-US" i="1">
+                            <a:latin typeface="Cambria Math" panose="02040503050406030204" pitchFamily="18" charset="0"/>
+                          </a:rPr>
+                          <m:t>输出</m:t>
+                        </m:r>
+                      </m:sub>
+                    </m:sSub>
+                  </m:oMath>
+                </a14:m>
+                <a:r>
+                  <a:rPr lang="zh-CN" altLang="en-US" dirty="0"/>
+                  <a:t>跟权重、偏移是什么关系？</a:t>
+                </a:r>
+                <a:endParaRPr lang="en-US" altLang="zh-CN" dirty="0"/>
+              </a:p>
+              <a:p>
+                <a:pPr marL="742950" lvl="1" indent="-285750">
+                  <a:buFont typeface="Arial" panose="020B0604020202020204" pitchFamily="34" charset="0"/>
+                  <a:buChar char="•"/>
+                </a:pPr>
+                <a:r>
+                  <a:rPr lang="zh-CN" altLang="en-US" dirty="0"/>
+                  <a:t>损失函数的表达式更新为：𝑒</a:t>
+                </a:r>
+                <a:r>
+                  <a:rPr lang="en-US" altLang="zh-CN" dirty="0"/>
+                  <a:t>=</a:t>
+                </a:r>
+                <a:r>
+                  <a:rPr lang="zh-CN" altLang="en-US" dirty="0"/>
+                  <a:t>𝐸</a:t>
+                </a:r>
+                <a:r>
+                  <a:rPr lang="en-US" altLang="zh-CN" dirty="0"/>
+                  <a:t>(</a:t>
+                </a:r>
+                <a:r>
+                  <a:rPr lang="zh-CN" altLang="en-US" dirty="0"/>
+                  <a:t>𝑤</a:t>
+                </a:r>
+                <a:r>
+                  <a:rPr lang="en-US" altLang="zh-CN" dirty="0"/>
+                  <a:t>,</a:t>
+                </a:r>
+                <a:r>
+                  <a:rPr lang="zh-CN" altLang="en-US" dirty="0"/>
+                  <a:t>𝑏</a:t>
+                </a:r>
+                <a:r>
+                  <a:rPr lang="en-US" altLang="zh-CN" dirty="0"/>
+                  <a:t>)</a:t>
+                </a:r>
+              </a:p>
+              <a:p>
+                <a:pPr marL="742950" lvl="1" indent="-285750">
+                  <a:buFont typeface="Arial" panose="020B0604020202020204" pitchFamily="34" charset="0"/>
+                  <a:buChar char="•"/>
+                </a:pPr>
+                <a:r>
+                  <a:rPr lang="zh-CN" altLang="en-US" dirty="0"/>
+                  <a:t>所以如何具体判断得到的一组权重、偏移是合适的呢？</a:t>
+                </a:r>
+                <a:endParaRPr lang="en-US" altLang="zh-CN" dirty="0"/>
+              </a:p>
+              <a:p>
+                <a:endParaRPr lang="en-US" altLang="zh-CN" dirty="0"/>
+              </a:p>
+              <a:p>
+                <a:pPr marL="285750" indent="-285750">
+                  <a:buFont typeface="Arial" panose="020B0604020202020204" pitchFamily="34" charset="0"/>
+                  <a:buChar char="•"/>
+                </a:pPr>
+                <a:r>
+                  <a:rPr lang="zh-CN" altLang="en-US" dirty="0"/>
+                  <a:t>自学、互学、展学</a:t>
+                </a:r>
+              </a:p>
+              <a:p>
+                <a:pPr marL="285750" indent="-285750">
+                  <a:buFont typeface="Arial" panose="020B0604020202020204" pitchFamily="34" charset="0"/>
+                  <a:buChar char="•"/>
+                </a:pPr>
+                <a:endParaRPr lang="en-US" altLang="zh-CN" dirty="0"/>
+              </a:p>
+              <a:p>
+                <a:pPr marL="285750" indent="-285750">
+                  <a:buFont typeface="Arial" panose="020B0604020202020204" pitchFamily="34" charset="0"/>
+                  <a:buChar char="•"/>
+                </a:pPr>
+                <a:endParaRPr dirty="0">
+                  <a:sym typeface="+mn-ea"/>
+                </a:endParaRPr>
+              </a:p>
+            </p:txBody>
+          </p:sp>
+        </mc:Choice>
+        <mc:Fallback>
+          <p:sp>
+            <p:nvSpPr>
+              <p:cNvPr id="2" name="文本占位符 1"/>
+              <p:cNvSpPr>
+                <a:spLocks noGrp="1" noRot="1" noChangeAspect="1" noMove="1" noResize="1" noEditPoints="1" noAdjustHandles="1" noChangeArrowheads="1" noChangeShapeType="1" noTextEdit="1"/>
+              </p:cNvSpPr>
+              <p:nvPr>
+                <p:ph type="body" idx="1"/>
+              </p:nvPr>
+            </p:nvSpPr>
+            <p:spPr>
+              <a:blipFill>
+                <a:blip r:embed="rId3"/>
+                <a:stretch>
+                  <a:fillRect/>
+                </a:stretch>
+              </a:blipFill>
+            </p:spPr>
+            <p:txBody>
+              <a:bodyPr/>
+              <a:lstStyle/>
+              <a:p>
+                <a:r>
+                  <a:rPr lang="zh-CN" altLang="en-US">
+                    <a:noFill/>
+                  </a:rPr>
+                  <a:t> </a:t>
+                </a:r>
+              </a:p>
+            </p:txBody>
+          </p:sp>
+        </mc:Fallback>
+      </mc:AlternateContent>
       <p:sp>
         <p:nvSpPr>
           <p:cNvPr id="3" name="标题 2"/>
@@ -10076,17 +10912,17 @@
           <a:p>
             <a:r>
               <a:rPr lang="zh-CN" altLang="en-US" dirty="0"/>
-              <a:t>主问题：什么是随机梯度下降</a:t>
+              <a:t>主问题：什么是损失函数</a:t>
             </a:r>
           </a:p>
         </p:txBody>
       </p:sp>
       <p:sp>
         <p:nvSpPr>
-          <p:cNvPr id="6" name="文本框 5">
+          <p:cNvPr id="5" name="文本框 4">
             <a:extLst>
               <a:ext uri="{FF2B5EF4-FFF2-40B4-BE49-F238E27FC236}">
-                <a16:creationId xmlns:a16="http://schemas.microsoft.com/office/drawing/2014/main" id="{D550D8E1-BEB8-0033-7E83-CCC47F04EFA7}"/>
+                <a16:creationId xmlns:a16="http://schemas.microsoft.com/office/drawing/2014/main" id="{047D079F-C248-EF2A-2DEB-18F7A634B2BE}"/>
               </a:ext>
             </a:extLst>
           </p:cNvPr>
@@ -10095,8 +10931,8 @@
         </p:nvSpPr>
         <p:spPr>
           <a:xfrm>
-            <a:off x="8928468" y="5165160"/>
-            <a:ext cx="1107996" cy="369332"/>
+            <a:off x="6512118" y="2083083"/>
+            <a:ext cx="4436827" cy="646331"/>
           </a:xfrm>
           <a:prstGeom prst="rect">
             <a:avLst/>
@@ -10104,61 +10940,414 @@
           <a:noFill/>
         </p:spPr>
         <p:txBody>
-          <a:bodyPr wrap="none" rtlCol="0">
+          <a:bodyPr wrap="square" rtlCol="0">
             <a:spAutoFit/>
           </a:bodyPr>
           <a:lstStyle/>
           <a:p>
             <a:r>
               <a:rPr kumimoji="1" lang="zh-CN" altLang="en-US" dirty="0"/>
-              <a:t>最小值点</a:t>
-            </a:r>
+              <a:t>根据上面的公式可知是函数映射关系，其中前者是函数的值，后者是函数的自变量</a:t>
+            </a:r>
+            <a:endParaRPr kumimoji="1" lang="en-US" altLang="zh-CN" dirty="0"/>
           </a:p>
         </p:txBody>
       </p:sp>
-      <p:pic>
-        <p:nvPicPr>
-          <p:cNvPr id="4" name="图片 3">
+      <mc:AlternateContent xmlns:mc="http://schemas.openxmlformats.org/markup-compatibility/2006">
+        <mc:Choice xmlns:a14="http://schemas.microsoft.com/office/drawing/2010/main" Requires="a14">
+          <p:sp>
+            <p:nvSpPr>
+              <p:cNvPr id="6" name="文本框 5">
+                <a:extLst>
+                  <a:ext uri="{FF2B5EF4-FFF2-40B4-BE49-F238E27FC236}">
+                    <a16:creationId xmlns:a16="http://schemas.microsoft.com/office/drawing/2014/main" id="{6422DDA1-E478-F5E1-FC89-C63AB104BE7C}"/>
+                  </a:ext>
+                </a:extLst>
+              </p:cNvPr>
+              <p:cNvSpPr txBox="1"/>
+              <p:nvPr/>
+            </p:nvSpPr>
+            <p:spPr>
+              <a:xfrm>
+                <a:off x="7495430" y="1305483"/>
+                <a:ext cx="3207050" cy="646331"/>
+              </a:xfrm>
+              <a:prstGeom prst="rect">
+                <a:avLst/>
+              </a:prstGeom>
+              <a:noFill/>
+            </p:spPr>
+            <p:txBody>
+              <a:bodyPr wrap="square" rtlCol="0">
+                <a:spAutoFit/>
+              </a:bodyPr>
+              <a:lstStyle/>
+              <a:p>
+                <a:pPr/>
+                <a14:m>
+                  <m:oMathPara xmlns:m="http://schemas.openxmlformats.org/officeDocument/2006/math">
+                    <m:oMathParaPr>
+                      <m:jc m:val="centerGroup"/>
+                    </m:oMathParaPr>
+                    <m:oMath xmlns:m="http://schemas.openxmlformats.org/officeDocument/2006/math">
+                      <m:r>
+                        <a:rPr lang="en-US" altLang="zh-CN" i="1" smtClean="0">
+                          <a:latin typeface="Cambria Math" panose="02040503050406030204" pitchFamily="18" charset="0"/>
+                        </a:rPr>
+                        <m:t>𝑦</m:t>
+                      </m:r>
+                      <m:r>
+                        <a:rPr lang="en-US" altLang="zh-CN" i="1" smtClean="0">
+                          <a:latin typeface="Cambria Math" panose="02040503050406030204" pitchFamily="18" charset="0"/>
+                        </a:rPr>
+                        <m:t>=</m:t>
+                      </m:r>
+                      <m:r>
+                        <a:rPr lang="en-US" altLang="zh-CN" i="1" smtClean="0">
+                          <a:latin typeface="Cambria Math" panose="02040503050406030204" pitchFamily="18" charset="0"/>
+                        </a:rPr>
+                        <m:t>𝑓</m:t>
+                      </m:r>
+                      <m:r>
+                        <a:rPr lang="en-US" altLang="zh-CN" i="1" smtClean="0">
+                          <a:latin typeface="Cambria Math" panose="02040503050406030204" pitchFamily="18" charset="0"/>
+                        </a:rPr>
+                        <m:t>(</m:t>
+                      </m:r>
+                      <m:sSub>
+                        <m:sSubPr>
+                          <m:ctrlPr>
+                            <a:rPr lang="en-US" altLang="zh-CN" i="1" smtClean="0">
+                              <a:latin typeface="Cambria Math" panose="02040503050406030204" pitchFamily="18" charset="0"/>
+                            </a:rPr>
+                          </m:ctrlPr>
+                        </m:sSubPr>
+                        <m:e>
+                          <m:r>
+                            <a:rPr lang="en-US" altLang="zh-CN" i="1">
+                              <a:latin typeface="Cambria Math" panose="02040503050406030204" pitchFamily="18" charset="0"/>
+                            </a:rPr>
+                            <m:t>𝑥</m:t>
+                          </m:r>
+                        </m:e>
+                        <m:sub>
+                          <m:r>
+                            <a:rPr lang="en-US" altLang="zh-CN" i="1">
+                              <a:latin typeface="Cambria Math" panose="02040503050406030204" pitchFamily="18" charset="0"/>
+                            </a:rPr>
+                            <m:t>1</m:t>
+                          </m:r>
+                        </m:sub>
+                      </m:sSub>
+                      <m:sSub>
+                        <m:sSubPr>
+                          <m:ctrlPr>
+                            <a:rPr lang="en-US" altLang="zh-CN" i="1" smtClean="0">
+                              <a:latin typeface="Cambria Math" panose="02040503050406030204" pitchFamily="18" charset="0"/>
+                            </a:rPr>
+                          </m:ctrlPr>
+                        </m:sSubPr>
+                        <m:e>
+                          <m:r>
+                            <a:rPr lang="en-US" altLang="zh-CN" i="1">
+                              <a:latin typeface="Cambria Math" panose="02040503050406030204" pitchFamily="18" charset="0"/>
+                            </a:rPr>
+                            <m:t>𝑤</m:t>
+                          </m:r>
+                        </m:e>
+                        <m:sub>
+                          <m:r>
+                            <a:rPr lang="en-US" altLang="zh-CN" i="1">
+                              <a:latin typeface="Cambria Math" panose="02040503050406030204" pitchFamily="18" charset="0"/>
+                            </a:rPr>
+                            <m:t>1</m:t>
+                          </m:r>
+                        </m:sub>
+                      </m:sSub>
+                      <m:r>
+                        <a:rPr lang="en-US" altLang="zh-CN" i="1" smtClean="0">
+                          <a:latin typeface="Cambria Math" panose="02040503050406030204" pitchFamily="18" charset="0"/>
+                        </a:rPr>
+                        <m:t>+ </m:t>
+                      </m:r>
+                      <m:sSub>
+                        <m:sSubPr>
+                          <m:ctrlPr>
+                            <a:rPr lang="en-US" altLang="zh-CN" i="1" smtClean="0">
+                              <a:latin typeface="Cambria Math" panose="02040503050406030204" pitchFamily="18" charset="0"/>
+                            </a:rPr>
+                          </m:ctrlPr>
+                        </m:sSubPr>
+                        <m:e>
+                          <m:r>
+                            <a:rPr lang="en-US" altLang="zh-CN" i="1">
+                              <a:latin typeface="Cambria Math" panose="02040503050406030204" pitchFamily="18" charset="0"/>
+                            </a:rPr>
+                            <m:t>𝑥</m:t>
+                          </m:r>
+                        </m:e>
+                        <m:sub>
+                          <m:r>
+                            <a:rPr lang="en-US" altLang="zh-CN" i="1">
+                              <a:latin typeface="Cambria Math" panose="02040503050406030204" pitchFamily="18" charset="0"/>
+                            </a:rPr>
+                            <m:t>2</m:t>
+                          </m:r>
+                        </m:sub>
+                      </m:sSub>
+                      <m:sSub>
+                        <m:sSubPr>
+                          <m:ctrlPr>
+                            <a:rPr lang="en-US" altLang="zh-CN" i="1" smtClean="0">
+                              <a:latin typeface="Cambria Math" panose="02040503050406030204" pitchFamily="18" charset="0"/>
+                            </a:rPr>
+                          </m:ctrlPr>
+                        </m:sSubPr>
+                        <m:e>
+                          <m:r>
+                            <a:rPr lang="en-US" altLang="zh-CN" i="1">
+                              <a:latin typeface="Cambria Math" panose="02040503050406030204" pitchFamily="18" charset="0"/>
+                            </a:rPr>
+                            <m:t>𝑤</m:t>
+                          </m:r>
+                        </m:e>
+                        <m:sub>
+                          <m:r>
+                            <a:rPr lang="en-US" altLang="zh-CN" i="1">
+                              <a:latin typeface="Cambria Math" panose="02040503050406030204" pitchFamily="18" charset="0"/>
+                            </a:rPr>
+                            <m:t>2</m:t>
+                          </m:r>
+                        </m:sub>
+                      </m:sSub>
+                      <m:r>
+                        <a:rPr lang="en-US" altLang="zh-CN" b="0" i="1" smtClean="0">
+                          <a:latin typeface="Cambria Math" panose="02040503050406030204" pitchFamily="18" charset="0"/>
+                        </a:rPr>
+                        <m:t>+</m:t>
+                      </m:r>
+                      <m:r>
+                        <a:rPr lang="en-US" altLang="zh-CN" b="0" i="1" smtClean="0">
+                          <a:latin typeface="Cambria Math" panose="02040503050406030204" pitchFamily="18" charset="0"/>
+                        </a:rPr>
+                        <m:t>𝑏</m:t>
+                      </m:r>
+                      <m:r>
+                        <a:rPr lang="en-US" altLang="zh-CN" i="1" smtClean="0">
+                          <a:latin typeface="Cambria Math" panose="02040503050406030204" pitchFamily="18" charset="0"/>
+                        </a:rPr>
+                        <m:t>)</m:t>
+                      </m:r>
+                    </m:oMath>
+                  </m:oMathPara>
+                </a14:m>
+                <a:endParaRPr lang="en-US" altLang="zh-CN" dirty="0"/>
+              </a:p>
+              <a:p>
+                <a:endParaRPr kumimoji="1" lang="zh-CN" altLang="en-US" dirty="0"/>
+              </a:p>
+            </p:txBody>
+          </p:sp>
+        </mc:Choice>
+        <mc:Fallback>
+          <p:sp>
+            <p:nvSpPr>
+              <p:cNvPr id="6" name="文本框 5">
+                <a:extLst>
+                  <a:ext uri="{FF2B5EF4-FFF2-40B4-BE49-F238E27FC236}">
+                    <a16:creationId xmlns:a16="http://schemas.microsoft.com/office/drawing/2014/main" id="{6422DDA1-E478-F5E1-FC89-C63AB104BE7C}"/>
+                  </a:ext>
+                </a:extLst>
+              </p:cNvPr>
+              <p:cNvSpPr txBox="1">
+                <a:spLocks noRot="1" noChangeAspect="1" noMove="1" noResize="1" noEditPoints="1" noAdjustHandles="1" noChangeArrowheads="1" noChangeShapeType="1" noTextEdit="1"/>
+              </p:cNvSpPr>
+              <p:nvPr/>
+            </p:nvSpPr>
+            <p:spPr>
+              <a:xfrm>
+                <a:off x="7495430" y="1305483"/>
+                <a:ext cx="3207050" cy="646331"/>
+              </a:xfrm>
+              <a:prstGeom prst="rect">
+                <a:avLst/>
+              </a:prstGeom>
+              <a:blipFill>
+                <a:blip r:embed="rId4"/>
+                <a:stretch>
+                  <a:fillRect/>
+                </a:stretch>
+              </a:blipFill>
+            </p:spPr>
+            <p:txBody>
+              <a:bodyPr/>
+              <a:lstStyle/>
+              <a:p>
+                <a:r>
+                  <a:rPr lang="zh-CN" altLang="en-US">
+                    <a:noFill/>
+                  </a:rPr>
+                  <a:t> </a:t>
+                </a:r>
+              </a:p>
+            </p:txBody>
+          </p:sp>
+        </mc:Fallback>
+      </mc:AlternateContent>
+      <p:sp>
+        <p:nvSpPr>
+          <p:cNvPr id="7" name="文本框 6">
             <a:extLst>
               <a:ext uri="{FF2B5EF4-FFF2-40B4-BE49-F238E27FC236}">
-                <a16:creationId xmlns:a16="http://schemas.microsoft.com/office/drawing/2014/main" id="{4BB06954-8482-8076-33E6-9FA8A53659CD}"/>
+                <a16:creationId xmlns:a16="http://schemas.microsoft.com/office/drawing/2014/main" id="{DF5FDE68-961E-4F56-4372-047B84CCE053}"/>
               </a:ext>
             </a:extLst>
           </p:cNvPr>
-          <p:cNvPicPr>
-            <a:picLocks noChangeAspect="1"/>
-          </p:cNvPicPr>
+          <p:cNvSpPr txBox="1"/>
           <p:nvPr/>
-        </p:nvPicPr>
-        <p:blipFill>
-          <a:blip r:embed="rId3">
-            <a:extLst>
-              <a:ext uri="{28A0092B-C50C-407E-A947-70E740481C1C}">
-                <a14:useLocalDpi xmlns:a14="http://schemas.microsoft.com/office/drawing/2010/main" val="0"/>
-              </a:ext>
-            </a:extLst>
-          </a:blip>
-          <a:stretch>
-            <a:fillRect/>
-          </a:stretch>
-        </p:blipFill>
+        </p:nvSpPr>
         <p:spPr>
           <a:xfrm>
-            <a:off x="5860692" y="2579977"/>
-            <a:ext cx="5661383" cy="953496"/>
+            <a:off x="6512118" y="2792100"/>
+            <a:ext cx="4436827" cy="369332"/>
           </a:xfrm>
           <a:prstGeom prst="rect">
             <a:avLst/>
           </a:prstGeom>
+          <a:noFill/>
         </p:spPr>
-      </p:pic>
+        <p:txBody>
+          <a:bodyPr wrap="square" rtlCol="0">
+            <a:spAutoFit/>
+          </a:bodyPr>
+          <a:lstStyle/>
+          <a:p>
+            <a:r>
+              <a:rPr kumimoji="1" lang="zh-CN" altLang="en-US" dirty="0"/>
+              <a:t>输入</a:t>
+            </a:r>
+            <a:r>
+              <a:rPr kumimoji="1" lang="en-US" altLang="zh-CN" dirty="0"/>
+              <a:t>x</a:t>
+            </a:r>
+            <a:r>
+              <a:rPr kumimoji="1" lang="zh-CN" altLang="en-US" dirty="0"/>
+              <a:t>是自变量还是常量？为什么？</a:t>
+            </a:r>
+            <a:endParaRPr kumimoji="1" lang="en-US" altLang="zh-CN" dirty="0"/>
+          </a:p>
+        </p:txBody>
+      </p:sp>
+      <p:sp>
+        <p:nvSpPr>
+          <p:cNvPr id="8" name="文本框 7">
+            <a:extLst>
+              <a:ext uri="{FF2B5EF4-FFF2-40B4-BE49-F238E27FC236}">
+                <a16:creationId xmlns:a16="http://schemas.microsoft.com/office/drawing/2014/main" id="{FB2B4D79-06D1-FCA4-CF9A-60235C8E48DE}"/>
+              </a:ext>
+            </a:extLst>
+          </p:cNvPr>
+          <p:cNvSpPr txBox="1"/>
+          <p:nvPr/>
+        </p:nvSpPr>
+        <p:spPr>
+          <a:xfrm>
+            <a:off x="6928237" y="3285631"/>
+            <a:ext cx="5263763" cy="923330"/>
+          </a:xfrm>
+          <a:prstGeom prst="rect">
+            <a:avLst/>
+          </a:prstGeom>
+          <a:noFill/>
+        </p:spPr>
+        <p:txBody>
+          <a:bodyPr wrap="square" rtlCol="0">
+            <a:spAutoFit/>
+          </a:bodyPr>
+          <a:lstStyle/>
+          <a:p>
+            <a:r>
+              <a:rPr kumimoji="1" lang="zh-CN" altLang="en-US" dirty="0"/>
+              <a:t>输入</a:t>
+            </a:r>
+            <a:r>
+              <a:rPr kumimoji="1" lang="en-US" altLang="zh-CN" dirty="0"/>
+              <a:t>x</a:t>
+            </a:r>
+            <a:r>
+              <a:rPr kumimoji="1" lang="zh-CN" altLang="en-US" dirty="0"/>
+              <a:t>是常量。</a:t>
+            </a:r>
+            <a:endParaRPr kumimoji="1" lang="en-US" altLang="zh-CN" dirty="0"/>
+          </a:p>
+          <a:p>
+            <a:r>
+              <a:rPr kumimoji="1" lang="zh-CN" altLang="en-US" dirty="0"/>
+              <a:t>因为损失函数用于在训练阶段确定合适的权重和偏移，而此时输入</a:t>
+            </a:r>
+            <a:r>
+              <a:rPr kumimoji="1" lang="en-US" altLang="zh-CN" dirty="0"/>
+              <a:t>x</a:t>
+            </a:r>
+            <a:r>
+              <a:rPr kumimoji="1" lang="zh-CN" altLang="en-US" dirty="0"/>
+              <a:t>是已知的（如为</a:t>
+            </a:r>
+            <a:r>
+              <a:rPr kumimoji="1" lang="en-US" altLang="zh-CN" dirty="0"/>
+              <a:t>100</a:t>
+            </a:r>
+            <a:r>
+              <a:rPr kumimoji="1" lang="zh-CN" altLang="en-US" dirty="0"/>
+              <a:t>个样本数据）</a:t>
+            </a:r>
+            <a:endParaRPr kumimoji="1" lang="en-US" altLang="zh-CN" dirty="0"/>
+          </a:p>
+        </p:txBody>
+      </p:sp>
+      <p:sp>
+        <p:nvSpPr>
+          <p:cNvPr id="9" name="文本框 8">
+            <a:extLst>
+              <a:ext uri="{FF2B5EF4-FFF2-40B4-BE49-F238E27FC236}">
+                <a16:creationId xmlns:a16="http://schemas.microsoft.com/office/drawing/2014/main" id="{0D8F1434-B3F4-45C5-C621-CBBF36D2758F}"/>
+              </a:ext>
+            </a:extLst>
+          </p:cNvPr>
+          <p:cNvSpPr txBox="1"/>
+          <p:nvPr/>
+        </p:nvSpPr>
+        <p:spPr>
+          <a:xfrm>
+            <a:off x="3172570" y="5098448"/>
+            <a:ext cx="7229061" cy="369332"/>
+          </a:xfrm>
+          <a:prstGeom prst="rect">
+            <a:avLst/>
+          </a:prstGeom>
+          <a:noFill/>
+        </p:spPr>
+        <p:txBody>
+          <a:bodyPr wrap="square" rtlCol="0">
+            <a:spAutoFit/>
+          </a:bodyPr>
+          <a:lstStyle/>
+          <a:p>
+            <a:r>
+              <a:rPr kumimoji="1" lang="zh-CN" altLang="en-US" dirty="0"/>
+              <a:t>求出损失函数的最小值，此时作为自变量的权重、偏移就是合适的</a:t>
+            </a:r>
+            <a:endParaRPr kumimoji="1" lang="en-US" altLang="zh-CN" dirty="0"/>
+          </a:p>
+        </p:txBody>
+      </p:sp>
     </p:spTree>
     <p:custDataLst>
       <p:tags r:id="rId1"/>
     </p:custDataLst>
     <p:extLst>
       <p:ext uri="{BB962C8B-B14F-4D97-AF65-F5344CB8AC3E}">
-        <p14:creationId xmlns:p14="http://schemas.microsoft.com/office/powerpoint/2010/main" val="1691772374"/>
+        <p14:creationId xmlns:p14="http://schemas.microsoft.com/office/powerpoint/2010/main" val="477393873"/>
       </p:ext>
     </p:extLst>
   </p:cSld>
@@ -10199,7 +11388,11 @@
                                           </p:stCondLst>
                                         </p:cTn>
                                         <p:tgtEl>
-                                          <p:spTgt spid="4"/>
+                                          <p:spTgt spid="2">
+                                            <p:txEl>
+                                              <p:pRg st="0" end="0"/>
+                                            </p:txEl>
+                                          </p:spTgt>
                                         </p:tgtEl>
                                         <p:attrNameLst>
                                           <p:attrName>style.visibility</p:attrName>
@@ -10427,7 +11620,7 @@
                             </p:stCondLst>
                             <p:childTnLst>
                               <p:par>
-                                <p:cTn id="25" presetID="1" presetClass="entr" presetSubtype="0" fill="hold" grpId="0" nodeType="clickEffect">
+                                <p:cTn id="25" presetID="1" presetClass="entr" presetSubtype="0" fill="hold" nodeType="clickEffect">
                                   <p:stCondLst>
                                     <p:cond delay="0"/>
                                   </p:stCondLst>
@@ -10440,7 +11633,11 @@
                                           </p:stCondLst>
                                         </p:cTn>
                                         <p:tgtEl>
-                                          <p:spTgt spid="6"/>
+                                          <p:spTgt spid="2">
+                                            <p:txEl>
+                                              <p:pRg st="5" end="5"/>
+                                            </p:txEl>
+                                          </p:spTgt>
                                         </p:tgtEl>
                                         <p:attrNameLst>
                                           <p:attrName>style.visibility</p:attrName>
@@ -10487,9 +11684,234 @@
                                         <p:tgtEl>
                                           <p:spTgt spid="2">
                                             <p:txEl>
-                                              <p:pRg st="5" end="5"/>
+                                              <p:pRg st="7" end="7"/>
                                             </p:txEl>
                                           </p:spTgt>
+                                        </p:tgtEl>
+                                        <p:attrNameLst>
+                                          <p:attrName>style.visibility</p:attrName>
+                                        </p:attrNameLst>
+                                      </p:cBhvr>
+                                      <p:to>
+                                        <p:strVal val="visible"/>
+                                      </p:to>
+                                    </p:set>
+                                  </p:childTnLst>
+                                </p:cTn>
+                              </p:par>
+                            </p:childTnLst>
+                          </p:cTn>
+                        </p:par>
+                      </p:childTnLst>
+                    </p:cTn>
+                  </p:par>
+                  <p:par>
+                    <p:cTn id="31" fill="hold">
+                      <p:stCondLst>
+                        <p:cond delay="indefinite"/>
+                      </p:stCondLst>
+                      <p:childTnLst>
+                        <p:par>
+                          <p:cTn id="32" fill="hold">
+                            <p:stCondLst>
+                              <p:cond delay="0"/>
+                            </p:stCondLst>
+                            <p:childTnLst>
+                              <p:par>
+                                <p:cTn id="33" presetID="1" presetClass="entr" presetSubtype="0" fill="hold" grpId="0" nodeType="clickEffect">
+                                  <p:stCondLst>
+                                    <p:cond delay="0"/>
+                                  </p:stCondLst>
+                                  <p:childTnLst>
+                                    <p:set>
+                                      <p:cBhvr>
+                                        <p:cTn id="34" dur="1" fill="hold">
+                                          <p:stCondLst>
+                                            <p:cond delay="0"/>
+                                          </p:stCondLst>
+                                        </p:cTn>
+                                        <p:tgtEl>
+                                          <p:spTgt spid="6"/>
+                                        </p:tgtEl>
+                                        <p:attrNameLst>
+                                          <p:attrName>style.visibility</p:attrName>
+                                        </p:attrNameLst>
+                                      </p:cBhvr>
+                                      <p:to>
+                                        <p:strVal val="visible"/>
+                                      </p:to>
+                                    </p:set>
+                                  </p:childTnLst>
+                                </p:cTn>
+                              </p:par>
+                            </p:childTnLst>
+                          </p:cTn>
+                        </p:par>
+                      </p:childTnLst>
+                    </p:cTn>
+                  </p:par>
+                  <p:par>
+                    <p:cTn id="35" fill="hold">
+                      <p:stCondLst>
+                        <p:cond delay="indefinite"/>
+                      </p:stCondLst>
+                      <p:childTnLst>
+                        <p:par>
+                          <p:cTn id="36" fill="hold">
+                            <p:stCondLst>
+                              <p:cond delay="0"/>
+                            </p:stCondLst>
+                            <p:childTnLst>
+                              <p:par>
+                                <p:cTn id="37" presetID="1" presetClass="entr" presetSubtype="0" fill="hold" grpId="0" nodeType="clickEffect">
+                                  <p:stCondLst>
+                                    <p:cond delay="0"/>
+                                  </p:stCondLst>
+                                  <p:childTnLst>
+                                    <p:set>
+                                      <p:cBhvr>
+                                        <p:cTn id="38" dur="1" fill="hold">
+                                          <p:stCondLst>
+                                            <p:cond delay="0"/>
+                                          </p:stCondLst>
+                                        </p:cTn>
+                                        <p:tgtEl>
+                                          <p:spTgt spid="5"/>
+                                        </p:tgtEl>
+                                        <p:attrNameLst>
+                                          <p:attrName>style.visibility</p:attrName>
+                                        </p:attrNameLst>
+                                      </p:cBhvr>
+                                      <p:to>
+                                        <p:strVal val="visible"/>
+                                      </p:to>
+                                    </p:set>
+                                  </p:childTnLst>
+                                </p:cTn>
+                              </p:par>
+                            </p:childTnLst>
+                          </p:cTn>
+                        </p:par>
+                      </p:childTnLst>
+                    </p:cTn>
+                  </p:par>
+                  <p:par>
+                    <p:cTn id="39" fill="hold">
+                      <p:stCondLst>
+                        <p:cond delay="indefinite"/>
+                      </p:stCondLst>
+                      <p:childTnLst>
+                        <p:par>
+                          <p:cTn id="40" fill="hold">
+                            <p:stCondLst>
+                              <p:cond delay="0"/>
+                            </p:stCondLst>
+                            <p:childTnLst>
+                              <p:par>
+                                <p:cTn id="41" presetID="1" presetClass="entr" presetSubtype="0" fill="hold" grpId="0" nodeType="clickEffect">
+                                  <p:stCondLst>
+                                    <p:cond delay="0"/>
+                                  </p:stCondLst>
+                                  <p:childTnLst>
+                                    <p:set>
+                                      <p:cBhvr>
+                                        <p:cTn id="42" dur="1" fill="hold">
+                                          <p:stCondLst>
+                                            <p:cond delay="0"/>
+                                          </p:stCondLst>
+                                        </p:cTn>
+                                        <p:tgtEl>
+                                          <p:spTgt spid="7"/>
+                                        </p:tgtEl>
+                                        <p:attrNameLst>
+                                          <p:attrName>style.visibility</p:attrName>
+                                        </p:attrNameLst>
+                                      </p:cBhvr>
+                                      <p:to>
+                                        <p:strVal val="visible"/>
+                                      </p:to>
+                                    </p:set>
+                                  </p:childTnLst>
+                                </p:cTn>
+                              </p:par>
+                            </p:childTnLst>
+                          </p:cTn>
+                        </p:par>
+                      </p:childTnLst>
+                    </p:cTn>
+                  </p:par>
+                  <p:par>
+                    <p:cTn id="43" fill="hold">
+                      <p:stCondLst>
+                        <p:cond delay="indefinite"/>
+                      </p:stCondLst>
+                      <p:childTnLst>
+                        <p:par>
+                          <p:cTn id="44" fill="hold">
+                            <p:stCondLst>
+                              <p:cond delay="0"/>
+                            </p:stCondLst>
+                            <p:childTnLst>
+                              <p:par>
+                                <p:cTn id="45" presetID="1" presetClass="entr" presetSubtype="0" fill="hold" grpId="0" nodeType="clickEffect">
+                                  <p:stCondLst>
+                                    <p:cond delay="0"/>
+                                  </p:stCondLst>
+                                  <p:childTnLst>
+                                    <p:set>
+                                      <p:cBhvr>
+                                        <p:cTn id="46" dur="1" fill="hold">
+                                          <p:stCondLst>
+                                            <p:cond delay="0"/>
+                                          </p:stCondLst>
+                                        </p:cTn>
+                                        <p:tgtEl>
+                                          <p:spTgt spid="8"/>
+                                        </p:tgtEl>
+                                        <p:attrNameLst>
+                                          <p:attrName>style.visibility</p:attrName>
+                                        </p:attrNameLst>
+                                      </p:cBhvr>
+                                      <p:to>
+                                        <p:strVal val="visible"/>
+                                      </p:to>
+                                    </p:set>
+                                  </p:childTnLst>
+                                </p:cTn>
+                              </p:par>
+                            </p:childTnLst>
+                          </p:cTn>
+                        </p:par>
+                      </p:childTnLst>
+                    </p:cTn>
+                  </p:par>
+                  <p:par>
+                    <p:cTn id="47" fill="hold">
+                      <p:stCondLst>
+                        <p:cond delay="indefinite"/>
+                      </p:stCondLst>
+                      <p:childTnLst>
+                        <p:par>
+                          <p:cTn id="48" fill="hold">
+                            <p:stCondLst>
+                              <p:cond delay="0"/>
+                            </p:stCondLst>
+                            <p:childTnLst>
+                              <p:par>
+                                <p:cTn id="49" presetID="1" presetClass="entr" presetSubtype="0" fill="hold" grpId="0" nodeType="clickEffect">
+                                  <p:stCondLst>
+                                    <p:cond delay="0"/>
+                                  </p:stCondLst>
+                                  <p:childTnLst>
+                                    <p:set>
+                                      <p:cBhvr>
+                                        <p:cTn id="50" dur="1" fill="hold">
+                                          <p:stCondLst>
+                                            <p:cond delay="0"/>
+                                          </p:stCondLst>
+                                        </p:cTn>
+                                        <p:tgtEl>
+                                          <p:spTgt spid="9"/>
                                         </p:tgtEl>
                                         <p:attrNameLst>
                                           <p:attrName>style.visibility</p:attrName>
@@ -10530,7 +11952,11 @@
       </p:par>
     </p:tnLst>
     <p:bldLst>
+      <p:bldP spid="5" grpId="0"/>
       <p:bldP spid="6" grpId="0"/>
+      <p:bldP spid="7" grpId="0"/>
+      <p:bldP spid="8" grpId="0"/>
+      <p:bldP spid="9" grpId="0"/>
     </p:bldLst>
   </p:timing>
 </p:sld>
@@ -11575,6 +13001,24 @@
 </p:tagLst>
 </file>
 
+<file path=ppt/tags/tag87.xml><?xml version="1.0" encoding="utf-8"?>
+<p:tagLst xmlns:a="http://schemas.openxmlformats.org/drawingml/2006/main" xmlns:r="http://schemas.openxmlformats.org/officeDocument/2006/relationships" xmlns:p="http://schemas.openxmlformats.org/presentationml/2006/main">
+  <p:tag name="KSO_WM_BEAUTIFY_FLAG" val="#wm#"/>
+  <p:tag name="KSO_WM_TEMPLATE_CATEGORY" val="custom"/>
+  <p:tag name="KSO_WM_TEMPLATE_INDEX" val="20187308"/>
+  <p:tag name="KSO_WM_SPECIAL_SOURCE" val="bdnull"/>
+</p:tagLst>
+</file>
+
+<file path=ppt/tags/tag88.xml><?xml version="1.0" encoding="utf-8"?>
+<p:tagLst xmlns:a="http://schemas.openxmlformats.org/drawingml/2006/main" xmlns:r="http://schemas.openxmlformats.org/officeDocument/2006/relationships" xmlns:p="http://schemas.openxmlformats.org/presentationml/2006/main">
+  <p:tag name="KSO_WM_BEAUTIFY_FLAG" val="#wm#"/>
+  <p:tag name="KSO_WM_TEMPLATE_CATEGORY" val="custom"/>
+  <p:tag name="KSO_WM_TEMPLATE_INDEX" val="20187308"/>
+  <p:tag name="KSO_WM_SPECIAL_SOURCE" val="bdnull"/>
+</p:tagLst>
+</file>
+
 <file path=ppt/tags/tag9.xml><?xml version="1.0" encoding="utf-8"?>
 <p:tagLst xmlns:a="http://schemas.openxmlformats.org/drawingml/2006/main" xmlns:r="http://schemas.openxmlformats.org/officeDocument/2006/relationships" xmlns:p="http://schemas.openxmlformats.org/presentationml/2006/main">
   <p:tag name="KSO_WM_UNIT_HIGHLIGHT" val="0"/>

</xml_diff>

<commit_message>
fix: fix weight index inverse bug
</commit_message>
<xml_diff>
--- a/lessons/2_gender_analyze/ppt/“判断性别”Demo需求分析和初步设计（下1）.pptx
+++ b/lessons/2_gender_analyze/ppt/“判断性别”Demo需求分析和初步设计（下1）.pptx
@@ -227,7 +227,7 @@
                 <a:latin typeface="微软雅黑" panose="020B0503020204020204" charset="-122"/>
                 <a:ea typeface="微软雅黑" panose="020B0503020204020204" charset="-122"/>
               </a:rPr>
-              <a:t>2022/8/30</a:t>
+              <a:t>2022/10/30</a:t>
             </a:fld>
             <a:endParaRPr lang="zh-CN" altLang="en-US">
               <a:latin typeface="微软雅黑" panose="020B0503020204020204" charset="-122"/>
@@ -410,7 +410,7 @@
           <a:p>
             <a:fld id="{1AC49D05-6128-4D0D-A32A-06A5E73B386C}" type="datetimeFigureOut">
               <a:rPr lang="zh-CN" altLang="en-US" smtClean="0"/>
-              <a:t>2022/8/30</a:t>
+              <a:t>2022/10/30</a:t>
             </a:fld>
             <a:endParaRPr lang="zh-CN" altLang="en-US"/>
           </a:p>
@@ -1072,7 +1072,7 @@
           <a:p>
             <a:fld id="{9EFD9D74-47D9-4702-A33C-335B63B48DBF}" type="datetimeFigureOut">
               <a:rPr lang="zh-CN" altLang="en-US" smtClean="0"/>
-              <a:t>2022/8/30</a:t>
+              <a:t>2022/10/30</a:t>
             </a:fld>
             <a:endParaRPr lang="zh-CN" altLang="en-US" dirty="0"/>
           </a:p>
@@ -1405,7 +1405,7 @@
           <a:p>
             <a:fld id="{760FBDFE-C587-4B4C-A407-44438C67B59E}" type="datetimeFigureOut">
               <a:rPr lang="zh-CN" altLang="en-US" smtClean="0"/>
-              <a:t>2022/8/30</a:t>
+              <a:t>2022/10/30</a:t>
             </a:fld>
             <a:endParaRPr lang="zh-CN" altLang="en-US"/>
           </a:p>
@@ -1578,7 +1578,7 @@
           <a:p>
             <a:fld id="{9EFD9D74-47D9-4702-A33C-335B63B48DBF}" type="datetimeFigureOut">
               <a:rPr lang="zh-CN" altLang="en-US" smtClean="0"/>
-              <a:t>2022/8/30</a:t>
+              <a:t>2022/10/30</a:t>
             </a:fld>
             <a:endParaRPr lang="zh-CN" altLang="en-US" dirty="0"/>
           </a:p>
@@ -2103,7 +2103,7 @@
           <a:p>
             <a:fld id="{760FBDFE-C587-4B4C-A407-44438C67B59E}" type="datetimeFigureOut">
               <a:rPr lang="zh-CN" altLang="en-US" smtClean="0"/>
-              <a:t>2022/8/30</a:t>
+              <a:t>2022/10/30</a:t>
             </a:fld>
             <a:endParaRPr lang="zh-CN" altLang="en-US"/>
           </a:p>
@@ -2851,7 +2851,7 @@
           <a:p>
             <a:fld id="{760FBDFE-C587-4B4C-A407-44438C67B59E}" type="datetimeFigureOut">
               <a:rPr lang="zh-CN" altLang="en-US" smtClean="0"/>
-              <a:t>2022/8/30</a:t>
+              <a:t>2022/10/30</a:t>
             </a:fld>
             <a:endParaRPr lang="zh-CN" altLang="en-US"/>
           </a:p>
@@ -3017,7 +3017,7 @@
           <a:p>
             <a:fld id="{760FBDFE-C587-4B4C-A407-44438C67B59E}" type="datetimeFigureOut">
               <a:rPr lang="zh-CN" altLang="en-US" smtClean="0"/>
-              <a:t>2022/8/30</a:t>
+              <a:t>2022/10/30</a:t>
             </a:fld>
             <a:endParaRPr lang="zh-CN" altLang="en-US"/>
           </a:p>
@@ -3131,7 +3131,7 @@
           <a:p>
             <a:fld id="{760FBDFE-C587-4B4C-A407-44438C67B59E}" type="datetimeFigureOut">
               <a:rPr lang="zh-CN" altLang="en-US" smtClean="0"/>
-              <a:t>2022/8/30</a:t>
+              <a:t>2022/10/30</a:t>
             </a:fld>
             <a:endParaRPr lang="zh-CN" altLang="en-US"/>
           </a:p>
@@ -3461,7 +3461,7 @@
           <a:p>
             <a:fld id="{9EFD9D74-47D9-4702-A33C-335B63B48DBF}" type="datetimeFigureOut">
               <a:rPr lang="zh-CN" altLang="en-US" smtClean="0"/>
-              <a:t>2022/8/30</a:t>
+              <a:t>2022/10/30</a:t>
             </a:fld>
             <a:endParaRPr lang="zh-CN" altLang="en-US" dirty="0"/>
           </a:p>
@@ -3974,7 +3974,7 @@
           <a:p>
             <a:fld id="{760FBDFE-C587-4B4C-A407-44438C67B59E}" type="datetimeFigureOut">
               <a:rPr lang="zh-CN" altLang="en-US" smtClean="0"/>
-              <a:t>2022/8/30</a:t>
+              <a:t>2022/10/30</a:t>
             </a:fld>
             <a:endParaRPr lang="zh-CN" altLang="en-US"/>
           </a:p>
@@ -4088,7 +4088,7 @@
           <a:p>
             <a:fld id="{760FBDFE-C587-4B4C-A407-44438C67B59E}" type="datetimeFigureOut">
               <a:rPr lang="zh-CN" altLang="en-US" smtClean="0"/>
-              <a:t>2022/8/30</a:t>
+              <a:t>2022/10/30</a:t>
             </a:fld>
             <a:endParaRPr lang="zh-CN" altLang="en-US"/>
           </a:p>
@@ -4376,7 +4376,7 @@
           <a:p>
             <a:fld id="{82F288E0-7875-42C4-84C8-98DBBD3BF4D2}" type="datetimeFigureOut">
               <a:rPr lang="zh-CN" altLang="en-US" smtClean="0"/>
-              <a:t>2022/8/30</a:t>
+              <a:t>2022/10/30</a:t>
             </a:fld>
             <a:endParaRPr lang="zh-CN" altLang="en-US"/>
           </a:p>
@@ -4835,7 +4835,7 @@
           <a:p>
             <a:fld id="{760FBDFE-C587-4B4C-A407-44438C67B59E}" type="datetimeFigureOut">
               <a:rPr lang="zh-CN" altLang="en-US" smtClean="0"/>
-              <a:t>2022/8/30</a:t>
+              <a:t>2022/10/30</a:t>
             </a:fld>
             <a:endParaRPr lang="zh-CN" altLang="en-US"/>
           </a:p>
@@ -5504,7 +5504,7 @@
           <a:p>
             <a:fld id="{9EFD9D74-47D9-4702-A33C-335B63B48DBF}" type="datetimeFigureOut">
               <a:rPr lang="zh-CN" altLang="en-US" smtClean="0"/>
-              <a:t>2022/8/30</a:t>
+              <a:t>2022/10/30</a:t>
             </a:fld>
             <a:endParaRPr lang="zh-CN" altLang="en-US" dirty="0"/>
           </a:p>
@@ -5652,7 +5652,7 @@
           <a:p>
             <a:fld id="{9EFD9D74-47D9-4702-A33C-335B63B48DBF}" type="datetimeFigureOut">
               <a:rPr lang="zh-CN" altLang="en-US" smtClean="0"/>
-              <a:t>2022/8/30</a:t>
+              <a:t>2022/10/30</a:t>
             </a:fld>
             <a:endParaRPr lang="zh-CN" altLang="en-US" dirty="0"/>
           </a:p>
@@ -8771,10 +8771,10 @@
       </p:sp>
       <p:pic>
         <p:nvPicPr>
-          <p:cNvPr id="4" name="图片 3">
+          <p:cNvPr id="6" name="图片 5">
             <a:extLst>
               <a:ext uri="{FF2B5EF4-FFF2-40B4-BE49-F238E27FC236}">
-                <a16:creationId xmlns:a16="http://schemas.microsoft.com/office/drawing/2014/main" id="{483803A2-185D-B3D9-6001-D4AB89852C31}"/>
+                <a16:creationId xmlns:a16="http://schemas.microsoft.com/office/drawing/2014/main" id="{21E5FE0D-D076-E529-838A-01114266E7B0}"/>
               </a:ext>
             </a:extLst>
           </p:cNvPr>
@@ -8797,7 +8797,7 @@
         </p:blipFill>
         <p:spPr>
           <a:xfrm>
-            <a:off x="6336241" y="2727882"/>
+            <a:off x="6651882" y="2095500"/>
             <a:ext cx="4127500" cy="2667000"/>
           </a:xfrm>
           <a:prstGeom prst="rect">
@@ -8950,7 +8950,7 @@
                                           </p:stCondLst>
                                         </p:cTn>
                                         <p:tgtEl>
-                                          <p:spTgt spid="4"/>
+                                          <p:spTgt spid="6"/>
                                         </p:tgtEl>
                                         <p:attrNameLst>
                                           <p:attrName>style.visibility</p:attrName>
@@ -10634,8 +10634,8 @@
           <a:chExt cx="0" cy="0"/>
         </a:xfrm>
       </p:grpSpPr>
-      <mc:AlternateContent xmlns:mc="http://schemas.openxmlformats.org/markup-compatibility/2006">
-        <mc:Choice xmlns:a14="http://schemas.microsoft.com/office/drawing/2010/main" Requires="a14">
+      <mc:AlternateContent xmlns:mc="http://schemas.openxmlformats.org/markup-compatibility/2006" xmlns:a14="http://schemas.microsoft.com/office/drawing/2010/main">
+        <mc:Choice Requires="a14">
           <p:sp>
             <p:nvSpPr>
               <p:cNvPr id="2" name="文本占位符 1"/>
@@ -10718,19 +10718,7 @@
                       <a:rPr lang="zh-CN" altLang="en-US" i="1">
                         <a:latin typeface="Cambria Math" panose="02040503050406030204" pitchFamily="18" charset="0"/>
                       </a:rPr>
-                      <m:t>就是</m:t>
-                    </m:r>
-                    <m:r>
-                      <a:rPr lang="zh-CN" altLang="en-US" i="1">
-                        <a:latin typeface="Cambria Math" panose="02040503050406030204" pitchFamily="18" charset="0"/>
-                      </a:rPr>
-                      <m:t>合适</m:t>
-                    </m:r>
-                    <m:r>
-                      <a:rPr lang="zh-CN" altLang="en-US" i="1">
-                        <a:latin typeface="Cambria Math" panose="02040503050406030204" pitchFamily="18" charset="0"/>
-                      </a:rPr>
-                      <m:t>的</m:t>
+                      <m:t>就是合适的</m:t>
                     </m:r>
                   </m:oMath>
                 </a14:m>
@@ -10861,7 +10849,7 @@
             </p:txBody>
           </p:sp>
         </mc:Choice>
-        <mc:Fallback>
+        <mc:Fallback xmlns="">
           <p:sp>
             <p:nvSpPr>
               <p:cNvPr id="2" name="文本占位符 1"/>
@@ -10953,8 +10941,8 @@
           </a:p>
         </p:txBody>
       </p:sp>
-      <mc:AlternateContent xmlns:mc="http://schemas.openxmlformats.org/markup-compatibility/2006">
-        <mc:Choice xmlns:a14="http://schemas.microsoft.com/office/drawing/2010/main" Requires="a14">
+      <mc:AlternateContent xmlns:mc="http://schemas.openxmlformats.org/markup-compatibility/2006" xmlns:a14="http://schemas.microsoft.com/office/drawing/2010/main">
+        <mc:Choice Requires="a14">
           <p:sp>
             <p:nvSpPr>
               <p:cNvPr id="6" name="文本框 5">
@@ -11149,7 +11137,7 @@
             </p:txBody>
           </p:sp>
         </mc:Choice>
-        <mc:Fallback>
+        <mc:Fallback xmlns="">
           <p:sp>
             <p:nvSpPr>
               <p:cNvPr id="6" name="文本框 5">

</xml_diff>